<commit_message>
Changes made on the airport
</commit_message>
<xml_diff>
--- a/Presentation_OstfaliaUni.pptx
+++ b/Presentation_OstfaliaUni.pptx
@@ -6,14 +6,23 @@
     <p:sldMasterId id="2147483745" r:id="rId5"/>
   </p:sldMasterIdLst>
   <p:notesMasterIdLst>
-    <p:notesMasterId r:id="rId8"/>
+    <p:notesMasterId r:id="rId17"/>
   </p:notesMasterIdLst>
   <p:handoutMasterIdLst>
-    <p:handoutMasterId r:id="rId9"/>
+    <p:handoutMasterId r:id="rId18"/>
   </p:handoutMasterIdLst>
   <p:sldIdLst>
     <p:sldId id="256" r:id="rId6"/>
-    <p:sldId id="257" r:id="rId7"/>
+    <p:sldId id="258" r:id="rId7"/>
+    <p:sldId id="259" r:id="rId8"/>
+    <p:sldId id="261" r:id="rId9"/>
+    <p:sldId id="263" r:id="rId10"/>
+    <p:sldId id="262" r:id="rId11"/>
+    <p:sldId id="264" r:id="rId12"/>
+    <p:sldId id="266" r:id="rId13"/>
+    <p:sldId id="268" r:id="rId14"/>
+    <p:sldId id="267" r:id="rId15"/>
+    <p:sldId id="260" r:id="rId16"/>
   </p:sldIdLst>
   <p:sldSz cx="12192000" cy="6858000"/>
   <p:notesSz cx="6797675" cy="9928225"/>
@@ -686,6 +695,178 @@
     </a:lvl9pPr>
   </p:notesStyle>
 </p:notesMaster>
+</file>
+
+<file path=ppt/notesSlides/notesSlide1.xml><?xml version="1.0" encoding="utf-8"?>
+<p:notes xmlns:a="http://schemas.openxmlformats.org/drawingml/2006/main" xmlns:r="http://schemas.openxmlformats.org/officeDocument/2006/relationships" xmlns:p="http://schemas.openxmlformats.org/presentationml/2006/main">
+  <p:cSld>
+    <p:spTree>
+      <p:nvGrpSpPr>
+        <p:cNvPr id="1" name=""/>
+        <p:cNvGrpSpPr/>
+        <p:nvPr/>
+      </p:nvGrpSpPr>
+      <p:grpSpPr>
+        <a:xfrm>
+          <a:off x="0" y="0"/>
+          <a:ext cx="0" cy="0"/>
+          <a:chOff x="0" y="0"/>
+          <a:chExt cx="0" cy="0"/>
+        </a:xfrm>
+      </p:grpSpPr>
+      <p:sp>
+        <p:nvSpPr>
+          <p:cNvPr id="2" name="Slide Image Placeholder 1"/>
+          <p:cNvSpPr>
+            <a:spLocks noGrp="1" noRot="1" noChangeAspect="1"/>
+          </p:cNvSpPr>
+          <p:nvPr>
+            <p:ph type="sldImg"/>
+          </p:nvPr>
+        </p:nvSpPr>
+        <p:spPr/>
+      </p:sp>
+      <p:sp>
+        <p:nvSpPr>
+          <p:cNvPr id="3" name="Notes Placeholder 2"/>
+          <p:cNvSpPr>
+            <a:spLocks noGrp="1"/>
+          </p:cNvSpPr>
+          <p:nvPr>
+            <p:ph type="body" idx="1"/>
+          </p:nvPr>
+        </p:nvSpPr>
+        <p:spPr/>
+        <p:txBody>
+          <a:bodyPr/>
+          <a:lstStyle/>
+          <a:p>
+            <a:r>
+              <a:rPr lang="es-ES" dirty="0" err="1"/>
+              <a:t>Working</a:t>
+            </a:r>
+            <a:r>
+              <a:rPr lang="es-ES" dirty="0"/>
+              <a:t> </a:t>
+            </a:r>
+            <a:r>
+              <a:rPr lang="es-ES" dirty="0" err="1"/>
+              <a:t>principle</a:t>
+            </a:r>
+            <a:endParaRPr lang="es-ES" dirty="0"/>
+          </a:p>
+          <a:p>
+            <a:r>
+              <a:rPr lang="en-US" dirty="0"/>
+              <a:t>The variable shear stiffness G2t2 that is required for the activation of the adaptive web can in principle be achieved by changing either the web’s shear modulus or its thickness. The change in shear stiffness of the adaptive web will lead to a shift of the shear center in horizontal direction and thus to a non-zero twist of the profile.</a:t>
+            </a:r>
+          </a:p>
+          <a:p>
+            <a:endParaRPr lang="en-US" dirty="0"/>
+          </a:p>
+          <a:p>
+            <a:r>
+              <a:rPr lang="en-US" dirty="0"/>
+              <a:t>Case</a:t>
+            </a:r>
+            <a:r>
+              <a:rPr lang="en-US" baseline="0" dirty="0"/>
+              <a:t> 1-Raither:</a:t>
+            </a:r>
+          </a:p>
+          <a:p>
+            <a:r>
+              <a:rPr lang="en-US" dirty="0"/>
+              <a:t>An implementation based on the variation of the elastic modulus of a polymer web due to changes in temperature is investigated.</a:t>
+            </a:r>
+          </a:p>
+          <a:p>
+            <a:endParaRPr lang="es-ES" dirty="0"/>
+          </a:p>
+          <a:p>
+            <a:r>
+              <a:rPr lang="es-ES" dirty="0"/>
+              <a:t>Case 2-</a:t>
+            </a:r>
+            <a:r>
+              <a:rPr lang="es-ES" baseline="0" dirty="0"/>
+              <a:t>Runkel:</a:t>
+            </a:r>
+          </a:p>
+          <a:p>
+            <a:r>
+              <a:rPr lang="en-US" baseline="0" dirty="0"/>
+              <a:t>A particular material anisotropy by varying </a:t>
+            </a:r>
+            <a:r>
+              <a:rPr lang="en-US" baseline="0" dirty="0" err="1"/>
+              <a:t>fibre</a:t>
+            </a:r>
+            <a:r>
+              <a:rPr lang="en-US" baseline="0" dirty="0"/>
+              <a:t> orientation and thickness of the component is introduced.</a:t>
+            </a:r>
+            <a:endParaRPr lang="es-ES" baseline="0" dirty="0"/>
+          </a:p>
+          <a:p>
+            <a:endParaRPr lang="en-US" dirty="0"/>
+          </a:p>
+          <a:p>
+            <a:r>
+              <a:rPr lang="en-US" dirty="0"/>
+              <a:t>Case</a:t>
+            </a:r>
+            <a:r>
+              <a:rPr lang="en-US" baseline="0" dirty="0"/>
+              <a:t> 3-Chiral:</a:t>
+            </a:r>
+          </a:p>
+          <a:p>
+            <a:r>
+              <a:rPr lang="en-GB" dirty="0"/>
+              <a:t>At a particular external load, the shear flow in the web exceeds the buckling limit, resulting in a drastic reduction of the effective shear modulus of this structural element</a:t>
+            </a:r>
+            <a:endParaRPr lang="en-US" dirty="0"/>
+          </a:p>
+          <a:p>
+            <a:endParaRPr lang="es-ES" dirty="0"/>
+          </a:p>
+        </p:txBody>
+      </p:sp>
+      <p:sp>
+        <p:nvSpPr>
+          <p:cNvPr id="4" name="Slide Number Placeholder 3"/>
+          <p:cNvSpPr>
+            <a:spLocks noGrp="1"/>
+          </p:cNvSpPr>
+          <p:nvPr>
+            <p:ph type="sldNum" sz="quarter" idx="10"/>
+          </p:nvPr>
+        </p:nvSpPr>
+        <p:spPr/>
+        <p:txBody>
+          <a:bodyPr/>
+          <a:lstStyle/>
+          <a:p>
+            <a:fld id="{3B11FC8D-FEAC-3A4D-B17B-284E661AD230}" type="slidenum">
+              <a:rPr lang="en-US" smtClean="0"/>
+              <a:t>3</a:t>
+            </a:fld>
+            <a:endParaRPr lang="en-US"/>
+          </a:p>
+        </p:txBody>
+      </p:sp>
+    </p:spTree>
+    <p:extLst>
+      <p:ext uri="{BB962C8B-B14F-4D97-AF65-F5344CB8AC3E}">
+        <p14:creationId xmlns:p14="http://schemas.microsoft.com/office/powerpoint/2010/main" val="2226853090"/>
+      </p:ext>
+    </p:extLst>
+  </p:cSld>
+  <p:clrMapOvr>
+    <a:masterClrMapping/>
+  </p:clrMapOvr>
+</p:notes>
 </file>
 
 <file path=ppt/slideLayouts/slideLayout1.xml><?xml version="1.0" encoding="utf-8"?>
@@ -5514,14 +5695,31 @@
             <p:ph type="body" sz="quarter" idx="11"/>
           </p:nvPr>
         </p:nvSpPr>
-        <p:spPr/>
+        <p:spPr>
+          <a:xfrm>
+            <a:off x="4871863" y="3861048"/>
+            <a:ext cx="6266301" cy="1080120"/>
+          </a:xfrm>
+        </p:spPr>
         <p:txBody>
           <a:bodyPr/>
           <a:lstStyle/>
           <a:p>
             <a:r>
               <a:rPr lang="en-GB" dirty="0"/>
-              <a:t>Alejandro Valverde López, Cranfield University, ETH Zürich</a:t>
+              <a:t>Alejandro Valverde López</a:t>
+            </a:r>
+          </a:p>
+          <a:p>
+            <a:r>
+              <a:rPr lang="en-GB" dirty="0"/>
+              <a:t>Cranfield University</a:t>
+            </a:r>
+          </a:p>
+          <a:p>
+            <a:r>
+              <a:rPr lang="en-GB" dirty="0"/>
+              <a:t>ETH Zürich</a:t>
             </a:r>
           </a:p>
         </p:txBody>
@@ -5590,6 +5788,375 @@
     <p:extLst>
       <p:ext uri="{BB962C8B-B14F-4D97-AF65-F5344CB8AC3E}">
         <p14:creationId xmlns:p14="http://schemas.microsoft.com/office/powerpoint/2010/main" val="3892451141"/>
+      </p:ext>
+    </p:extLst>
+  </p:cSld>
+  <p:clrMapOvr>
+    <a:masterClrMapping/>
+  </p:clrMapOvr>
+</p:sld>
+</file>
+
+<file path=ppt/slides/slide10.xml><?xml version="1.0" encoding="utf-8"?>
+<p:sld xmlns:a="http://schemas.openxmlformats.org/drawingml/2006/main" xmlns:r="http://schemas.openxmlformats.org/officeDocument/2006/relationships" xmlns:p="http://schemas.openxmlformats.org/presentationml/2006/main">
+  <p:cSld>
+    <p:spTree>
+      <p:nvGrpSpPr>
+        <p:cNvPr id="1" name=""/>
+        <p:cNvGrpSpPr/>
+        <p:nvPr/>
+      </p:nvGrpSpPr>
+      <p:grpSpPr>
+        <a:xfrm>
+          <a:off x="0" y="0"/>
+          <a:ext cx="0" cy="0"/>
+          <a:chOff x="0" y="0"/>
+          <a:chExt cx="0" cy="0"/>
+        </a:xfrm>
+      </p:grpSpPr>
+      <p:sp>
+        <p:nvSpPr>
+          <p:cNvPr id="2" name="Text Placeholder 1"/>
+          <p:cNvSpPr>
+            <a:spLocks noGrp="1"/>
+          </p:cNvSpPr>
+          <p:nvPr>
+            <p:ph type="body" sz="quarter" idx="20"/>
+          </p:nvPr>
+        </p:nvSpPr>
+        <p:spPr/>
+        <p:txBody>
+          <a:bodyPr/>
+          <a:lstStyle/>
+          <a:p>
+            <a:r>
+              <a:rPr lang="es-ES" dirty="0" err="1"/>
+              <a:t>Whole</a:t>
+            </a:r>
+            <a:r>
+              <a:rPr lang="es-ES" dirty="0"/>
+              <a:t> </a:t>
+            </a:r>
+            <a:r>
+              <a:rPr lang="es-ES" dirty="0" err="1"/>
+              <a:t>wing</a:t>
+            </a:r>
+            <a:r>
+              <a:rPr lang="es-ES" dirty="0"/>
+              <a:t> </a:t>
+            </a:r>
+            <a:r>
+              <a:rPr lang="es-ES" dirty="0" err="1"/>
+              <a:t>model</a:t>
+            </a:r>
+            <a:endParaRPr lang="es-ES" dirty="0"/>
+          </a:p>
+        </p:txBody>
+      </p:sp>
+      <p:sp>
+        <p:nvSpPr>
+          <p:cNvPr id="7" name="TextBox 6"/>
+          <p:cNvSpPr txBox="1"/>
+          <p:nvPr/>
+        </p:nvSpPr>
+        <p:spPr>
+          <a:xfrm>
+            <a:off x="695400" y="1412777"/>
+            <a:ext cx="6984776" cy="1703030"/>
+          </a:xfrm>
+          <a:prstGeom prst="rect">
+            <a:avLst/>
+          </a:prstGeom>
+          <a:noFill/>
+        </p:spPr>
+        <p:txBody>
+          <a:bodyPr wrap="square" rtlCol="0">
+            <a:spAutoFit/>
+          </a:bodyPr>
+          <a:lstStyle/>
+          <a:p>
+            <a:pPr marL="285750" indent="-285750">
+              <a:lnSpc>
+                <a:spcPct val="150000"/>
+              </a:lnSpc>
+              <a:buFont typeface="Arial" panose="020B0604020202020204" pitchFamily="34" charset="0"/>
+              <a:buChar char="•"/>
+            </a:pPr>
+            <a:r>
+              <a:rPr lang="de-CH" dirty="0"/>
+              <a:t>Embeded wing box with chiral structure in one of the web</a:t>
+            </a:r>
+          </a:p>
+          <a:p>
+            <a:pPr marL="285750" indent="-285750">
+              <a:lnSpc>
+                <a:spcPct val="150000"/>
+              </a:lnSpc>
+              <a:buFont typeface="Arial" panose="020B0604020202020204" pitchFamily="34" charset="0"/>
+              <a:buChar char="•"/>
+            </a:pPr>
+            <a:r>
+              <a:rPr lang="de-CH" dirty="0"/>
+              <a:t>Aerodynamic loads calculated using XFOIL and lift line evalution</a:t>
+            </a:r>
+          </a:p>
+          <a:p>
+            <a:pPr marL="285750" indent="-285750">
+              <a:lnSpc>
+                <a:spcPct val="150000"/>
+              </a:lnSpc>
+              <a:buFont typeface="Arial" panose="020B0604020202020204" pitchFamily="34" charset="0"/>
+              <a:buChar char="•"/>
+            </a:pPr>
+            <a:r>
+              <a:rPr lang="de-CH" dirty="0"/>
+              <a:t>FEM + XFOIL interection within a loop until convergence is achieved</a:t>
+            </a:r>
+            <a:endParaRPr lang="en-US" dirty="0"/>
+          </a:p>
+        </p:txBody>
+      </p:sp>
+      <p:pic>
+        <p:nvPicPr>
+          <p:cNvPr id="4" name="Picture 3"/>
+          <p:cNvPicPr>
+            <a:picLocks noChangeAspect="1"/>
+          </p:cNvPicPr>
+          <p:nvPr/>
+        </p:nvPicPr>
+        <p:blipFill>
+          <a:blip r:embed="rId2">
+            <a:extLst>
+              <a:ext uri="{28A0092B-C50C-407E-A947-70E740481C1C}">
+                <a14:useLocalDpi xmlns:a14="http://schemas.microsoft.com/office/drawing/2010/main" val="0"/>
+              </a:ext>
+            </a:extLst>
+          </a:blip>
+          <a:stretch>
+            <a:fillRect/>
+          </a:stretch>
+        </p:blipFill>
+        <p:spPr>
+          <a:xfrm>
+            <a:off x="2207568" y="3284984"/>
+            <a:ext cx="7776864" cy="2722947"/>
+          </a:xfrm>
+          <a:prstGeom prst="rect">
+            <a:avLst/>
+          </a:prstGeom>
+        </p:spPr>
+      </p:pic>
+    </p:spTree>
+    <p:extLst>
+      <p:ext uri="{BB962C8B-B14F-4D97-AF65-F5344CB8AC3E}">
+        <p14:creationId xmlns:p14="http://schemas.microsoft.com/office/powerpoint/2010/main" val="2176087766"/>
+      </p:ext>
+    </p:extLst>
+  </p:cSld>
+  <p:clrMapOvr>
+    <a:masterClrMapping/>
+  </p:clrMapOvr>
+</p:sld>
+</file>
+
+<file path=ppt/slides/slide11.xml><?xml version="1.0" encoding="utf-8"?>
+<p:sld xmlns:a="http://schemas.openxmlformats.org/drawingml/2006/main" xmlns:r="http://schemas.openxmlformats.org/officeDocument/2006/relationships" xmlns:p="http://schemas.openxmlformats.org/presentationml/2006/main">
+  <p:cSld>
+    <p:spTree>
+      <p:nvGrpSpPr>
+        <p:cNvPr id="1" name=""/>
+        <p:cNvGrpSpPr/>
+        <p:nvPr/>
+      </p:nvGrpSpPr>
+      <p:grpSpPr>
+        <a:xfrm>
+          <a:off x="0" y="0"/>
+          <a:ext cx="0" cy="0"/>
+          <a:chOff x="0" y="0"/>
+          <a:chExt cx="0" cy="0"/>
+        </a:xfrm>
+      </p:grpSpPr>
+      <p:sp>
+        <p:nvSpPr>
+          <p:cNvPr id="2" name="Text Placeholder 1"/>
+          <p:cNvSpPr>
+            <a:spLocks noGrp="1"/>
+          </p:cNvSpPr>
+          <p:nvPr>
+            <p:ph type="body" sz="quarter" idx="17"/>
+          </p:nvPr>
+        </p:nvSpPr>
+        <p:spPr/>
+        <p:txBody>
+          <a:bodyPr/>
+          <a:lstStyle/>
+          <a:p>
+            <a:r>
+              <a:rPr lang="es-ES" dirty="0" err="1"/>
+              <a:t>Thank</a:t>
+            </a:r>
+            <a:r>
+              <a:rPr lang="es-ES" dirty="0"/>
+              <a:t> </a:t>
+            </a:r>
+            <a:r>
+              <a:rPr lang="es-ES" dirty="0" err="1"/>
+              <a:t>you</a:t>
+            </a:r>
+            <a:r>
+              <a:rPr lang="es-ES" dirty="0"/>
+              <a:t> </a:t>
+            </a:r>
+            <a:r>
+              <a:rPr lang="es-ES" dirty="0" err="1"/>
+              <a:t>for</a:t>
+            </a:r>
+            <a:r>
+              <a:rPr lang="es-ES" dirty="0"/>
+              <a:t> </a:t>
+            </a:r>
+            <a:r>
+              <a:rPr lang="es-ES" dirty="0" err="1"/>
+              <a:t>your</a:t>
+            </a:r>
+            <a:r>
+              <a:rPr lang="es-ES" dirty="0"/>
+              <a:t> </a:t>
+            </a:r>
+            <a:r>
+              <a:rPr lang="es-ES" dirty="0" err="1"/>
+              <a:t>attention</a:t>
+            </a:r>
+            <a:r>
+              <a:rPr lang="es-ES" dirty="0"/>
+              <a:t>!</a:t>
+            </a:r>
+          </a:p>
+        </p:txBody>
+      </p:sp>
+      <p:sp>
+        <p:nvSpPr>
+          <p:cNvPr id="6" name="TextBox 5"/>
+          <p:cNvSpPr txBox="1"/>
+          <p:nvPr/>
+        </p:nvSpPr>
+        <p:spPr>
+          <a:xfrm>
+            <a:off x="551384" y="1844824"/>
+            <a:ext cx="11057861" cy="3139321"/>
+          </a:xfrm>
+          <a:prstGeom prst="rect">
+            <a:avLst/>
+          </a:prstGeom>
+          <a:noFill/>
+        </p:spPr>
+        <p:txBody>
+          <a:bodyPr wrap="square" rtlCol="0">
+            <a:spAutoFit/>
+          </a:bodyPr>
+          <a:lstStyle/>
+          <a:p>
+            <a:r>
+              <a:rPr lang="es-ES" noProof="1"/>
+              <a:t>Bibliography:</a:t>
+            </a:r>
+          </a:p>
+          <a:p>
+            <a:endParaRPr lang="es-ES" noProof="1"/>
+          </a:p>
+          <a:p>
+            <a:pPr marL="285750" indent="-285750">
+              <a:buFont typeface="Arial" pitchFamily="34" charset="0"/>
+              <a:buChar char="•"/>
+            </a:pPr>
+            <a:r>
+              <a:rPr lang="en-US" noProof="1"/>
+              <a:t>W. Raither, M. Heymanns, A. Bergamini, and P. Ermanni, “Morphing wing structure with controllable twist based on adaptive bending twist coupling,” Smart Mater. Struct., vol. 22, no. 6, p. 065017, Jun. 2013.</a:t>
+            </a:r>
+            <a:br>
+              <a:rPr lang="en-US" noProof="1"/>
+            </a:br>
+            <a:endParaRPr lang="en-US" noProof="1"/>
+          </a:p>
+          <a:p>
+            <a:pPr marL="285750" indent="-285750">
+              <a:buFont typeface="Arial" pitchFamily="34" charset="0"/>
+              <a:buChar char="•"/>
+            </a:pPr>
+            <a:r>
+              <a:rPr lang="en-US" dirty="0"/>
+              <a:t>F. </a:t>
+            </a:r>
+            <a:r>
+              <a:rPr lang="en-US" dirty="0" err="1"/>
+              <a:t>Runkel</a:t>
+            </a:r>
+            <a:r>
+              <a:rPr lang="en-US" dirty="0"/>
+              <a:t>, A. </a:t>
+            </a:r>
+            <a:r>
+              <a:rPr lang="en-US" dirty="0" err="1"/>
+              <a:t>Arrieta</a:t>
+            </a:r>
+            <a:r>
+              <a:rPr lang="en-US" dirty="0"/>
+              <a:t>, P. </a:t>
+            </a:r>
+            <a:r>
+              <a:rPr lang="en-US" dirty="0" err="1"/>
+              <a:t>Ermanni</a:t>
+            </a:r>
+            <a:r>
+              <a:rPr lang="en-US" dirty="0"/>
+              <a:t>, "Design of passive morphing wing structures using elastic instabilities", Proceedings of the 20th International Conference on Composite Materials, p. 1-12, Jul. 2015</a:t>
+            </a:r>
+            <a:br>
+              <a:rPr lang="en-US" dirty="0"/>
+            </a:br>
+            <a:endParaRPr lang="en-US" dirty="0"/>
+          </a:p>
+          <a:p>
+            <a:pPr marL="285750" indent="-285750">
+              <a:buFont typeface="Arial" pitchFamily="34" charset="0"/>
+              <a:buChar char="•"/>
+            </a:pPr>
+            <a:r>
+              <a:rPr lang="en-US" dirty="0"/>
+              <a:t>D. </a:t>
+            </a:r>
+            <a:r>
+              <a:rPr lang="en-US" dirty="0" err="1"/>
+              <a:t>Bornego</a:t>
+            </a:r>
+            <a:r>
+              <a:rPr lang="en-US" dirty="0"/>
+              <a:t>, F. </a:t>
+            </a:r>
+            <a:r>
+              <a:rPr lang="en-US" dirty="0" err="1"/>
+              <a:t>Scarpa</a:t>
+            </a:r>
+            <a:r>
+              <a:rPr lang="en-US" dirty="0"/>
+              <a:t>, C. </a:t>
+            </a:r>
+            <a:r>
+              <a:rPr lang="en-US" dirty="0" err="1"/>
+              <a:t>Remillat</a:t>
+            </a:r>
+            <a:r>
+              <a:rPr lang="en-US" dirty="0"/>
+              <a:t>, "Evaluation of hexagonal chiral structure for morphing airfoil concept", Proceedings of the Institution of Mechanical Engineers, Part G: Journal of Aerospace Engineering, p. 185--192, vol. 219, no. 3, 2005</a:t>
+            </a:r>
+            <a:endParaRPr lang="en-US" noProof="1"/>
+          </a:p>
+        </p:txBody>
+      </p:sp>
+    </p:spTree>
+    <p:extLst>
+      <p:ext uri="{BB962C8B-B14F-4D97-AF65-F5344CB8AC3E}">
+        <p14:creationId xmlns:p14="http://schemas.microsoft.com/office/powerpoint/2010/main" val="3506070799"/>
       </p:ext>
     </p:extLst>
   </p:cSld>
@@ -5623,7 +6190,7 @@
             <a:spLocks noGrp="1"/>
           </p:cNvSpPr>
           <p:nvPr>
-            <p:ph type="body" sz="quarter" idx="10"/>
+            <p:ph type="body" sz="quarter" idx="20"/>
           </p:nvPr>
         </p:nvSpPr>
         <p:spPr/>
@@ -5631,18 +6198,238 @@
           <a:bodyPr/>
           <a:lstStyle/>
           <a:p>
-            <a:endParaRPr lang="es-ES"/>
+            <a:r>
+              <a:rPr lang="es-ES" dirty="0" err="1"/>
+              <a:t>Motivation</a:t>
+            </a:r>
+            <a:endParaRPr lang="es-ES" dirty="0"/>
           </a:p>
         </p:txBody>
       </p:sp>
       <p:sp>
         <p:nvSpPr>
-          <p:cNvPr id="3" name="Text Placeholder 2"/>
+          <p:cNvPr id="6" name="TextBox 5"/>
+          <p:cNvSpPr txBox="1"/>
+          <p:nvPr/>
+        </p:nvSpPr>
+        <p:spPr>
+          <a:xfrm>
+            <a:off x="6577551" y="1424786"/>
+            <a:ext cx="5178056" cy="369332"/>
+          </a:xfrm>
+          <a:prstGeom prst="rect">
+            <a:avLst/>
+          </a:prstGeom>
+          <a:noFill/>
+        </p:spPr>
+        <p:txBody>
+          <a:bodyPr wrap="square" rtlCol="0">
+            <a:spAutoFit/>
+          </a:bodyPr>
+          <a:lstStyle/>
+          <a:p>
+            <a:pPr algn="ctr"/>
+            <a:r>
+              <a:rPr lang="es-ES" noProof="1"/>
+              <a:t>Gust alleviation</a:t>
+            </a:r>
+            <a:endParaRPr lang="en-US" noProof="1"/>
+          </a:p>
+        </p:txBody>
+      </p:sp>
+      <p:sp>
+        <p:nvSpPr>
+          <p:cNvPr id="7" name="TextBox 6"/>
+          <p:cNvSpPr txBox="1"/>
+          <p:nvPr/>
+        </p:nvSpPr>
+        <p:spPr>
+          <a:xfrm>
+            <a:off x="792101" y="1842629"/>
+            <a:ext cx="5301517" cy="369332"/>
+          </a:xfrm>
+          <a:prstGeom prst="rect">
+            <a:avLst/>
+          </a:prstGeom>
+          <a:noFill/>
+        </p:spPr>
+        <p:txBody>
+          <a:bodyPr wrap="square" rtlCol="0">
+            <a:spAutoFit/>
+          </a:bodyPr>
+          <a:lstStyle/>
+          <a:p>
+            <a:pPr algn="ctr"/>
+            <a:r>
+              <a:rPr lang="es-ES" noProof="1"/>
+              <a:t>Wing demonstrator</a:t>
+            </a:r>
+            <a:endParaRPr lang="en-US" noProof="1"/>
+          </a:p>
+        </p:txBody>
+      </p:sp>
+      <p:pic>
+        <p:nvPicPr>
+          <p:cNvPr id="8" name="Picture 7"/>
+          <p:cNvPicPr>
+            <a:picLocks noChangeAspect="1"/>
+          </p:cNvPicPr>
+          <p:nvPr/>
+        </p:nvPicPr>
+        <p:blipFill>
+          <a:blip r:embed="rId2">
+            <a:extLst>
+              <a:ext uri="{28A0092B-C50C-407E-A947-70E740481C1C}">
+                <a14:useLocalDpi xmlns:a14="http://schemas.microsoft.com/office/drawing/2010/main" val="0"/>
+              </a:ext>
+            </a:extLst>
+          </a:blip>
+          <a:stretch>
+            <a:fillRect/>
+          </a:stretch>
+        </p:blipFill>
+        <p:spPr>
+          <a:xfrm>
+            <a:off x="6373381" y="2027295"/>
+            <a:ext cx="5586396" cy="1738724"/>
+          </a:xfrm>
+          <a:prstGeom prst="rect">
+            <a:avLst/>
+          </a:prstGeom>
+        </p:spPr>
+      </p:pic>
+      <p:pic>
+        <p:nvPicPr>
+          <p:cNvPr id="9" name="Picture 8"/>
+          <p:cNvPicPr>
+            <a:picLocks noChangeAspect="1"/>
+          </p:cNvPicPr>
+          <p:nvPr/>
+        </p:nvPicPr>
+        <p:blipFill>
+          <a:blip r:embed="rId3">
+            <a:extLst>
+              <a:ext uri="{28A0092B-C50C-407E-A947-70E740481C1C}">
+                <a14:useLocalDpi xmlns:a14="http://schemas.microsoft.com/office/drawing/2010/main" val="0"/>
+              </a:ext>
+            </a:extLst>
+          </a:blip>
+          <a:stretch>
+            <a:fillRect/>
+          </a:stretch>
+        </p:blipFill>
+        <p:spPr>
+          <a:xfrm>
+            <a:off x="6645003" y="4066022"/>
+            <a:ext cx="5043153" cy="1786679"/>
+          </a:xfrm>
+          <a:prstGeom prst="rect">
+            <a:avLst/>
+          </a:prstGeom>
+        </p:spPr>
+      </p:pic>
+      <p:pic>
+        <p:nvPicPr>
+          <p:cNvPr id="10" name="Picture 2"/>
+          <p:cNvPicPr>
+            <a:picLocks noChangeAspect="1" noChangeArrowheads="1"/>
+          </p:cNvPicPr>
+          <p:nvPr/>
+        </p:nvPicPr>
+        <p:blipFill>
+          <a:blip r:embed="rId4">
+            <a:extLst>
+              <a:ext uri="{28A0092B-C50C-407E-A947-70E740481C1C}">
+                <a14:useLocalDpi xmlns:a14="http://schemas.microsoft.com/office/drawing/2010/main" val="0"/>
+              </a:ext>
+            </a:extLst>
+          </a:blip>
+          <a:srcRect/>
+          <a:stretch>
+            <a:fillRect/>
+          </a:stretch>
+        </p:blipFill>
+        <p:spPr bwMode="auto">
+          <a:xfrm>
+            <a:off x="1035491" y="2647013"/>
+            <a:ext cx="4814739" cy="3012385"/>
+          </a:xfrm>
+          <a:prstGeom prst="rect">
+            <a:avLst/>
+          </a:prstGeom>
+          <a:noFill/>
+          <a:ln>
+            <a:noFill/>
+          </a:ln>
+          <a:effectLst/>
+          <a:extLst>
+            <a:ext uri="{909E8E84-426E-40DD-AFC4-6F175D3DCCD1}">
+              <a14:hiddenFill xmlns:a14="http://schemas.microsoft.com/office/drawing/2010/main">
+                <a:solidFill>
+                  <a:schemeClr val="accent1"/>
+                </a:solidFill>
+              </a14:hiddenFill>
+            </a:ext>
+            <a:ext uri="{91240B29-F687-4F45-9708-019B960494DF}">
+              <a14:hiddenLine xmlns:a14="http://schemas.microsoft.com/office/drawing/2010/main" w="9525">
+                <a:solidFill>
+                  <a:schemeClr val="tx1"/>
+                </a:solidFill>
+                <a:miter lim="800000"/>
+                <a:headEnd/>
+                <a:tailEnd/>
+              </a14:hiddenLine>
+            </a:ext>
+            <a:ext uri="{AF507438-7753-43E0-B8FC-AC1667EBCBE1}">
+              <a14:hiddenEffects xmlns:a14="http://schemas.microsoft.com/office/drawing/2010/main">
+                <a:effectLst>
+                  <a:outerShdw dist="35921" dir="2700000" algn="ctr" rotWithShape="0">
+                    <a:schemeClr val="bg2"/>
+                  </a:outerShdw>
+                </a:effectLst>
+              </a14:hiddenEffects>
+            </a:ext>
+          </a:extLst>
+        </p:spPr>
+      </p:pic>
+    </p:spTree>
+    <p:extLst>
+      <p:ext uri="{BB962C8B-B14F-4D97-AF65-F5344CB8AC3E}">
+        <p14:creationId xmlns:p14="http://schemas.microsoft.com/office/powerpoint/2010/main" val="1798364017"/>
+      </p:ext>
+    </p:extLst>
+  </p:cSld>
+  <p:clrMapOvr>
+    <a:masterClrMapping/>
+  </p:clrMapOvr>
+</p:sld>
+</file>
+
+<file path=ppt/slides/slide3.xml><?xml version="1.0" encoding="utf-8"?>
+<p:sld xmlns:a="http://schemas.openxmlformats.org/drawingml/2006/main" xmlns:r="http://schemas.openxmlformats.org/officeDocument/2006/relationships" xmlns:p="http://schemas.openxmlformats.org/presentationml/2006/main">
+  <p:cSld>
+    <p:spTree>
+      <p:nvGrpSpPr>
+        <p:cNvPr id="1" name=""/>
+        <p:cNvGrpSpPr/>
+        <p:nvPr/>
+      </p:nvGrpSpPr>
+      <p:grpSpPr>
+        <a:xfrm>
+          <a:off x="0" y="0"/>
+          <a:ext cx="0" cy="0"/>
+          <a:chOff x="0" y="0"/>
+          <a:chExt cx="0" cy="0"/>
+        </a:xfrm>
+      </p:grpSpPr>
+      <p:sp>
+        <p:nvSpPr>
+          <p:cNvPr id="2" name="Text Placeholder 1"/>
           <p:cNvSpPr>
             <a:spLocks noGrp="1"/>
           </p:cNvSpPr>
           <p:nvPr>
-            <p:ph type="body" sz="quarter" idx="15"/>
+            <p:ph type="body" sz="quarter" idx="20"/>
           </p:nvPr>
         </p:nvSpPr>
         <p:spPr/>
@@ -5650,18 +6437,533 @@
           <a:bodyPr/>
           <a:lstStyle/>
           <a:p>
-            <a:endParaRPr lang="es-ES"/>
+            <a:r>
+              <a:rPr lang="es-ES" dirty="0" err="1"/>
+              <a:t>Different</a:t>
+            </a:r>
+            <a:r>
+              <a:rPr lang="es-ES" dirty="0"/>
+              <a:t> </a:t>
+            </a:r>
+            <a:r>
+              <a:rPr lang="es-ES" dirty="0" err="1"/>
+              <a:t>approaches</a:t>
+            </a:r>
+            <a:endParaRPr lang="es-ES" dirty="0"/>
           </a:p>
         </p:txBody>
       </p:sp>
-      <p:sp>
-        <p:nvSpPr>
-          <p:cNvPr id="4" name="Content Placeholder 3"/>
+      <p:pic>
+        <p:nvPicPr>
+          <p:cNvPr id="11" name="Picture 10"/>
+          <p:cNvPicPr>
+            <a:picLocks noChangeAspect="1"/>
+          </p:cNvPicPr>
+          <p:nvPr/>
+        </p:nvPicPr>
+        <p:blipFill>
+          <a:blip r:embed="rId3">
+            <a:extLst>
+              <a:ext uri="{28A0092B-C50C-407E-A947-70E740481C1C}">
+                <a14:useLocalDpi xmlns:a14="http://schemas.microsoft.com/office/drawing/2010/main" val="0"/>
+              </a:ext>
+            </a:extLst>
+          </a:blip>
+          <a:stretch>
+            <a:fillRect/>
+          </a:stretch>
+        </p:blipFill>
+        <p:spPr>
+          <a:xfrm>
+            <a:off x="1559496" y="1830514"/>
+            <a:ext cx="2957087" cy="1777671"/>
+          </a:xfrm>
+          <a:prstGeom prst="rect">
+            <a:avLst/>
+          </a:prstGeom>
+        </p:spPr>
+      </p:pic>
+      <p:pic>
+        <p:nvPicPr>
+          <p:cNvPr id="12" name="Picture 11"/>
+          <p:cNvPicPr>
+            <a:picLocks noChangeAspect="1"/>
+          </p:cNvPicPr>
+          <p:nvPr/>
+        </p:nvPicPr>
+        <p:blipFill>
+          <a:blip r:embed="rId4" cstate="print">
+            <a:extLst>
+              <a:ext uri="{28A0092B-C50C-407E-A947-70E740481C1C}">
+                <a14:useLocalDpi xmlns:a14="http://schemas.microsoft.com/office/drawing/2010/main" val="0"/>
+              </a:ext>
+            </a:extLst>
+          </a:blip>
+          <a:stretch>
+            <a:fillRect/>
+          </a:stretch>
+        </p:blipFill>
+        <p:spPr>
+          <a:xfrm>
+            <a:off x="2162149" y="4624642"/>
+            <a:ext cx="2265728" cy="1478445"/>
+          </a:xfrm>
+          <a:prstGeom prst="rect">
+            <a:avLst/>
+          </a:prstGeom>
+        </p:spPr>
+      </p:pic>
+      <p:pic>
+        <p:nvPicPr>
+          <p:cNvPr id="13" name="Picture 12"/>
+          <p:cNvPicPr>
+            <a:picLocks noChangeAspect="1"/>
+          </p:cNvPicPr>
+          <p:nvPr/>
+        </p:nvPicPr>
+        <p:blipFill>
+          <a:blip r:embed="rId5">
+            <a:extLst>
+              <a:ext uri="{28A0092B-C50C-407E-A947-70E740481C1C}">
+                <a14:useLocalDpi xmlns:a14="http://schemas.microsoft.com/office/drawing/2010/main" val="0"/>
+              </a:ext>
+            </a:extLst>
+          </a:blip>
+          <a:stretch>
+            <a:fillRect/>
+          </a:stretch>
+        </p:blipFill>
+        <p:spPr>
+          <a:xfrm>
+            <a:off x="7870975" y="4624642"/>
+            <a:ext cx="3369266" cy="1630753"/>
+          </a:xfrm>
+          <a:prstGeom prst="rect">
+            <a:avLst/>
+          </a:prstGeom>
+        </p:spPr>
+      </p:pic>
+      <p:pic>
+        <p:nvPicPr>
+          <p:cNvPr id="14" name="Picture 13"/>
+          <p:cNvPicPr>
+            <a:picLocks noChangeAspect="1"/>
+          </p:cNvPicPr>
+          <p:nvPr/>
+        </p:nvPicPr>
+        <p:blipFill rotWithShape="1">
+          <a:blip r:embed="rId6" cstate="print">
+            <a:extLst>
+              <a:ext uri="{28A0092B-C50C-407E-A947-70E740481C1C}">
+                <a14:useLocalDpi xmlns:a14="http://schemas.microsoft.com/office/drawing/2010/main" val="0"/>
+              </a:ext>
+            </a:extLst>
+          </a:blip>
+          <a:srcRect l="2419" t="13458" r="3943" b="11684"/>
+          <a:stretch/>
+        </p:blipFill>
+        <p:spPr>
+          <a:xfrm>
+            <a:off x="4744962" y="5098149"/>
+            <a:ext cx="1213762" cy="531429"/>
+          </a:xfrm>
+          <a:prstGeom prst="rect">
+            <a:avLst/>
+          </a:prstGeom>
+        </p:spPr>
+      </p:pic>
+      <p:pic>
+        <p:nvPicPr>
+          <p:cNvPr id="15" name="Picture 14"/>
+          <p:cNvPicPr>
+            <a:picLocks noChangeAspect="1"/>
+          </p:cNvPicPr>
+          <p:nvPr/>
+        </p:nvPicPr>
+        <p:blipFill>
+          <a:blip r:embed="rId7" cstate="print">
+            <a:extLst>
+              <a:ext uri="{28A0092B-C50C-407E-A947-70E740481C1C}">
+                <a14:useLocalDpi xmlns:a14="http://schemas.microsoft.com/office/drawing/2010/main" val="0"/>
+              </a:ext>
+            </a:extLst>
+          </a:blip>
+          <a:stretch>
+            <a:fillRect/>
+          </a:stretch>
+        </p:blipFill>
+        <p:spPr>
+          <a:xfrm>
+            <a:off x="321850" y="4581287"/>
+            <a:ext cx="1737408" cy="1710627"/>
+          </a:xfrm>
+          <a:prstGeom prst="rect">
+            <a:avLst/>
+          </a:prstGeom>
+        </p:spPr>
+      </p:pic>
+      <p:sp>
+        <p:nvSpPr>
+          <p:cNvPr id="16" name="Right Arrow 13"/>
+          <p:cNvSpPr/>
+          <p:nvPr/>
+        </p:nvSpPr>
+        <p:spPr>
+          <a:xfrm>
+            <a:off x="4871863" y="2182207"/>
+            <a:ext cx="2879271" cy="382698"/>
+          </a:xfrm>
+          <a:prstGeom prst="rightArrow">
+            <a:avLst/>
+          </a:prstGeom>
+          <a:solidFill>
+            <a:schemeClr val="accent1">
+              <a:lumMod val="75000"/>
+            </a:schemeClr>
+          </a:solidFill>
+          <a:ln>
+            <a:noFill/>
+          </a:ln>
+        </p:spPr>
+        <p:style>
+          <a:lnRef idx="2">
+            <a:schemeClr val="accent1">
+              <a:shade val="50000"/>
+            </a:schemeClr>
+          </a:lnRef>
+          <a:fillRef idx="1">
+            <a:schemeClr val="accent1"/>
+          </a:fillRef>
+          <a:effectRef idx="0">
+            <a:schemeClr val="accent1"/>
+          </a:effectRef>
+          <a:fontRef idx="minor">
+            <a:schemeClr val="lt1"/>
+          </a:fontRef>
+        </p:style>
+        <p:txBody>
+          <a:bodyPr rtlCol="0" anchor="ctr"/>
+          <a:lstStyle/>
+          <a:p>
+            <a:pPr algn="ctr"/>
+            <a:endParaRPr lang="en-US"/>
+          </a:p>
+        </p:txBody>
+      </p:sp>
+      <p:sp>
+        <p:nvSpPr>
+          <p:cNvPr id="17" name="Right Arrow 14"/>
+          <p:cNvSpPr/>
+          <p:nvPr/>
+        </p:nvSpPr>
+        <p:spPr>
+          <a:xfrm rot="5400000">
+            <a:off x="9356859" y="3434261"/>
+            <a:ext cx="722302" cy="509763"/>
+          </a:xfrm>
+          <a:prstGeom prst="rightArrow">
+            <a:avLst/>
+          </a:prstGeom>
+          <a:solidFill>
+            <a:schemeClr val="accent1">
+              <a:lumMod val="75000"/>
+            </a:schemeClr>
+          </a:solidFill>
+          <a:ln>
+            <a:noFill/>
+          </a:ln>
+        </p:spPr>
+        <p:style>
+          <a:lnRef idx="2">
+            <a:schemeClr val="accent1">
+              <a:shade val="50000"/>
+            </a:schemeClr>
+          </a:lnRef>
+          <a:fillRef idx="1">
+            <a:schemeClr val="accent1"/>
+          </a:fillRef>
+          <a:effectRef idx="0">
+            <a:schemeClr val="accent1"/>
+          </a:effectRef>
+          <a:fontRef idx="minor">
+            <a:schemeClr val="lt1"/>
+          </a:fontRef>
+        </p:style>
+        <p:txBody>
+          <a:bodyPr rtlCol="0" anchor="ctr"/>
+          <a:lstStyle/>
+          <a:p>
+            <a:pPr algn="ctr"/>
+            <a:endParaRPr lang="en-US"/>
+          </a:p>
+        </p:txBody>
+      </p:sp>
+      <p:sp>
+        <p:nvSpPr>
+          <p:cNvPr id="18" name="TextBox 17"/>
+          <p:cNvSpPr txBox="1"/>
+          <p:nvPr/>
+        </p:nvSpPr>
+        <p:spPr>
+          <a:xfrm>
+            <a:off x="551384" y="1409773"/>
+            <a:ext cx="5260687" cy="369332"/>
+          </a:xfrm>
+          <a:prstGeom prst="rect">
+            <a:avLst/>
+          </a:prstGeom>
+          <a:noFill/>
+        </p:spPr>
+        <p:txBody>
+          <a:bodyPr wrap="square" rtlCol="0">
+            <a:spAutoFit/>
+          </a:bodyPr>
+          <a:lstStyle/>
+          <a:p>
+            <a:pPr algn="ctr"/>
+            <a:r>
+              <a:rPr lang="de-CH" dirty="0"/>
+              <a:t>Working principle, publicated on: Raither(2013) </a:t>
+            </a:r>
+            <a:endParaRPr lang="en-US" dirty="0"/>
+          </a:p>
+        </p:txBody>
+      </p:sp>
+      <p:sp>
+        <p:nvSpPr>
+          <p:cNvPr id="19" name="TextBox 18"/>
+          <p:cNvSpPr txBox="1"/>
+          <p:nvPr/>
+        </p:nvSpPr>
+        <p:spPr>
+          <a:xfrm>
+            <a:off x="7408260" y="4152491"/>
+            <a:ext cx="3654413" cy="646331"/>
+          </a:xfrm>
+          <a:prstGeom prst="rect">
+            <a:avLst/>
+          </a:prstGeom>
+          <a:noFill/>
+        </p:spPr>
+        <p:txBody>
+          <a:bodyPr wrap="square" rtlCol="0">
+            <a:spAutoFit/>
+          </a:bodyPr>
+          <a:lstStyle/>
+          <a:p>
+            <a:pPr algn="ctr"/>
+            <a:r>
+              <a:rPr lang="de-CH" dirty="0"/>
+              <a:t>Runkel (2015): </a:t>
+            </a:r>
+            <a:r>
+              <a:rPr lang="el-GR" dirty="0"/>
+              <a:t>Δ</a:t>
+            </a:r>
+            <a:r>
+              <a:rPr lang="es-ES" dirty="0"/>
+              <a:t>β → material </a:t>
+            </a:r>
+            <a:r>
+              <a:rPr lang="en-US" dirty="0"/>
+              <a:t>anisotropy</a:t>
+            </a:r>
+          </a:p>
+        </p:txBody>
+      </p:sp>
+      <p:pic>
+        <p:nvPicPr>
+          <p:cNvPr id="20" name="Picture 19"/>
+          <p:cNvPicPr>
+            <a:picLocks noChangeAspect="1"/>
+          </p:cNvPicPr>
+          <p:nvPr/>
+        </p:nvPicPr>
+        <p:blipFill>
+          <a:blip r:embed="rId8">
+            <a:extLst>
+              <a:ext uri="{28A0092B-C50C-407E-A947-70E740481C1C}">
+                <a14:useLocalDpi xmlns:a14="http://schemas.microsoft.com/office/drawing/2010/main" val="0"/>
+              </a:ext>
+            </a:extLst>
+          </a:blip>
+          <a:stretch>
+            <a:fillRect/>
+          </a:stretch>
+        </p:blipFill>
+        <p:spPr>
+          <a:xfrm>
+            <a:off x="8040888" y="1169581"/>
+            <a:ext cx="3354249" cy="2511927"/>
+          </a:xfrm>
+          <a:prstGeom prst="rect">
+            <a:avLst/>
+          </a:prstGeom>
+        </p:spPr>
+      </p:pic>
+      <p:sp>
+        <p:nvSpPr>
+          <p:cNvPr id="21" name="Right Arrow 18"/>
+          <p:cNvSpPr/>
+          <p:nvPr/>
+        </p:nvSpPr>
+        <p:spPr>
+          <a:xfrm rot="10800000">
+            <a:off x="6262176" y="5199943"/>
+            <a:ext cx="1146084" cy="406083"/>
+          </a:xfrm>
+          <a:prstGeom prst="rightArrow">
+            <a:avLst/>
+          </a:prstGeom>
+          <a:solidFill>
+            <a:schemeClr val="accent1">
+              <a:lumMod val="75000"/>
+            </a:schemeClr>
+          </a:solidFill>
+          <a:ln>
+            <a:noFill/>
+          </a:ln>
+        </p:spPr>
+        <p:style>
+          <a:lnRef idx="2">
+            <a:schemeClr val="accent1">
+              <a:shade val="50000"/>
+            </a:schemeClr>
+          </a:lnRef>
+          <a:fillRef idx="1">
+            <a:schemeClr val="accent1"/>
+          </a:fillRef>
+          <a:effectRef idx="0">
+            <a:schemeClr val="accent1"/>
+          </a:effectRef>
+          <a:fontRef idx="minor">
+            <a:schemeClr val="lt1"/>
+          </a:fontRef>
+        </p:style>
+        <p:txBody>
+          <a:bodyPr rtlCol="0" anchor="ctr"/>
+          <a:lstStyle/>
+          <a:p>
+            <a:pPr algn="ctr"/>
+            <a:endParaRPr lang="en-US"/>
+          </a:p>
+        </p:txBody>
+      </p:sp>
+      <p:sp>
+        <p:nvSpPr>
+          <p:cNvPr id="22" name="TextBox 21"/>
+          <p:cNvSpPr txBox="1"/>
+          <p:nvPr/>
+        </p:nvSpPr>
+        <p:spPr>
+          <a:xfrm>
+            <a:off x="8040888" y="950218"/>
+            <a:ext cx="3080277" cy="369332"/>
+          </a:xfrm>
+          <a:prstGeom prst="rect">
+            <a:avLst/>
+          </a:prstGeom>
+          <a:noFill/>
+        </p:spPr>
+        <p:txBody>
+          <a:bodyPr wrap="square" rtlCol="0">
+            <a:spAutoFit/>
+          </a:bodyPr>
+          <a:lstStyle/>
+          <a:p>
+            <a:pPr algn="ctr"/>
+            <a:r>
+              <a:rPr lang="el-GR" dirty="0"/>
+              <a:t>Δ</a:t>
+            </a:r>
+            <a:r>
+              <a:rPr lang="es-ES" dirty="0"/>
+              <a:t>T → G</a:t>
+            </a:r>
+            <a:r>
+              <a:rPr lang="es-ES" baseline="-25000" dirty="0"/>
+              <a:t>2</a:t>
+            </a:r>
+            <a:r>
+              <a:rPr lang="es-ES" dirty="0"/>
+              <a:t> t</a:t>
+            </a:r>
+            <a:r>
+              <a:rPr lang="es-ES" baseline="-25000" dirty="0"/>
+              <a:t>2</a:t>
+            </a:r>
+            <a:endParaRPr lang="en-US" baseline="-25000" dirty="0"/>
+          </a:p>
+        </p:txBody>
+      </p:sp>
+      <p:sp>
+        <p:nvSpPr>
+          <p:cNvPr id="23" name="TextBox 22"/>
+          <p:cNvSpPr txBox="1"/>
+          <p:nvPr/>
+        </p:nvSpPr>
+        <p:spPr>
+          <a:xfrm>
+            <a:off x="810094" y="3875492"/>
+            <a:ext cx="3654413" cy="646331"/>
+          </a:xfrm>
+          <a:prstGeom prst="rect">
+            <a:avLst/>
+          </a:prstGeom>
+          <a:noFill/>
+        </p:spPr>
+        <p:txBody>
+          <a:bodyPr wrap="square" rtlCol="0">
+            <a:spAutoFit/>
+          </a:bodyPr>
+          <a:lstStyle/>
+          <a:p>
+            <a:pPr algn="ctr"/>
+            <a:r>
+              <a:rPr lang="en-US" dirty="0"/>
+              <a:t>Current project: Buckling-induced shear modulus variation</a:t>
+            </a:r>
+          </a:p>
+        </p:txBody>
+      </p:sp>
+    </p:spTree>
+    <p:extLst>
+      <p:ext uri="{BB962C8B-B14F-4D97-AF65-F5344CB8AC3E}">
+        <p14:creationId xmlns:p14="http://schemas.microsoft.com/office/powerpoint/2010/main" val="2030320332"/>
+      </p:ext>
+    </p:extLst>
+  </p:cSld>
+  <p:clrMapOvr>
+    <a:masterClrMapping/>
+  </p:clrMapOvr>
+</p:sld>
+</file>
+
+<file path=ppt/slides/slide4.xml><?xml version="1.0" encoding="utf-8"?>
+<p:sld xmlns:a="http://schemas.openxmlformats.org/drawingml/2006/main" xmlns:r="http://schemas.openxmlformats.org/officeDocument/2006/relationships" xmlns:p="http://schemas.openxmlformats.org/presentationml/2006/main">
+  <p:cSld>
+    <p:spTree>
+      <p:nvGrpSpPr>
+        <p:cNvPr id="1" name=""/>
+        <p:cNvGrpSpPr/>
+        <p:nvPr/>
+      </p:nvGrpSpPr>
+      <p:grpSpPr>
+        <a:xfrm>
+          <a:off x="0" y="0"/>
+          <a:ext cx="0" cy="0"/>
+          <a:chOff x="0" y="0"/>
+          <a:chExt cx="0" cy="0"/>
+        </a:xfrm>
+      </p:grpSpPr>
+      <p:sp>
+        <p:nvSpPr>
+          <p:cNvPr id="2" name="Text Placeholder 1"/>
           <p:cNvSpPr>
             <a:spLocks noGrp="1"/>
           </p:cNvSpPr>
           <p:nvPr>
-            <p:ph sz="quarter" idx="16"/>
+            <p:ph type="body" sz="quarter" idx="20"/>
           </p:nvPr>
         </p:nvSpPr>
         <p:spPr/>
@@ -5669,14 +6971,1255 @@
           <a:bodyPr/>
           <a:lstStyle/>
           <a:p>
-            <a:endParaRPr lang="es-ES"/>
+            <a:r>
+              <a:rPr lang="es-ES" dirty="0" err="1"/>
+              <a:t>Chiral</a:t>
+            </a:r>
+            <a:r>
+              <a:rPr lang="es-ES" dirty="0"/>
+              <a:t> reticular </a:t>
+            </a:r>
+            <a:r>
+              <a:rPr lang="es-ES" dirty="0" err="1"/>
+              <a:t>structure</a:t>
+            </a:r>
+            <a:endParaRPr lang="es-ES" dirty="0"/>
           </a:p>
         </p:txBody>
       </p:sp>
+      <p:pic>
+        <p:nvPicPr>
+          <p:cNvPr id="11" name="Picture 10"/>
+          <p:cNvPicPr>
+            <a:picLocks noChangeAspect="1"/>
+          </p:cNvPicPr>
+          <p:nvPr/>
+        </p:nvPicPr>
+        <p:blipFill>
+          <a:blip r:embed="rId2">
+            <a:extLst>
+              <a:ext uri="{28A0092B-C50C-407E-A947-70E740481C1C}">
+                <a14:useLocalDpi xmlns:a14="http://schemas.microsoft.com/office/drawing/2010/main" val="0"/>
+              </a:ext>
+            </a:extLst>
+          </a:blip>
+          <a:stretch>
+            <a:fillRect/>
+          </a:stretch>
+        </p:blipFill>
+        <p:spPr>
+          <a:xfrm>
+            <a:off x="983432" y="1779105"/>
+            <a:ext cx="2350141" cy="1777671"/>
+          </a:xfrm>
+          <a:prstGeom prst="rect">
+            <a:avLst/>
+          </a:prstGeom>
+        </p:spPr>
+      </p:pic>
+      <p:sp>
+        <p:nvSpPr>
+          <p:cNvPr id="18" name="TextBox 17"/>
+          <p:cNvSpPr txBox="1"/>
+          <p:nvPr/>
+        </p:nvSpPr>
+        <p:spPr>
+          <a:xfrm>
+            <a:off x="551384" y="1409773"/>
+            <a:ext cx="5260687" cy="369332"/>
+          </a:xfrm>
+          <a:prstGeom prst="rect">
+            <a:avLst/>
+          </a:prstGeom>
+          <a:noFill/>
+        </p:spPr>
+        <p:txBody>
+          <a:bodyPr wrap="square" rtlCol="0">
+            <a:spAutoFit/>
+          </a:bodyPr>
+          <a:lstStyle/>
+          <a:p>
+            <a:r>
+              <a:rPr lang="de-CH" dirty="0"/>
+              <a:t>Constitutive elements</a:t>
+            </a:r>
+            <a:endParaRPr lang="en-US" dirty="0"/>
+          </a:p>
+        </p:txBody>
+      </p:sp>
+      <p:grpSp>
+        <p:nvGrpSpPr>
+          <p:cNvPr id="6" name="Group 5"/>
+          <p:cNvGrpSpPr/>
+          <p:nvPr/>
+        </p:nvGrpSpPr>
+        <p:grpSpPr>
+          <a:xfrm>
+            <a:off x="6698569" y="1191617"/>
+            <a:ext cx="5260687" cy="4393834"/>
+            <a:chOff x="6715125" y="548680"/>
+            <a:chExt cx="5260687" cy="4393834"/>
+          </a:xfrm>
+        </p:grpSpPr>
+        <p:pic>
+          <p:nvPicPr>
+            <p:cNvPr id="3" name="Picture 2"/>
+            <p:cNvPicPr>
+              <a:picLocks noChangeAspect="1"/>
+            </p:cNvPicPr>
+            <p:nvPr/>
+          </p:nvPicPr>
+          <p:blipFill>
+            <a:blip r:embed="rId3">
+              <a:extLst>
+                <a:ext uri="{28A0092B-C50C-407E-A947-70E740481C1C}">
+                  <a14:useLocalDpi xmlns:a14="http://schemas.microsoft.com/office/drawing/2010/main" val="0"/>
+                </a:ext>
+              </a:extLst>
+            </a:blip>
+            <a:stretch>
+              <a:fillRect/>
+            </a:stretch>
+          </p:blipFill>
+          <p:spPr>
+            <a:xfrm>
+              <a:off x="6906306" y="548680"/>
+              <a:ext cx="4878326" cy="3880486"/>
+            </a:xfrm>
+            <a:prstGeom prst="rect">
+              <a:avLst/>
+            </a:prstGeom>
+          </p:spPr>
+        </p:pic>
+        <p:sp>
+          <p:nvSpPr>
+            <p:cNvPr id="24" name="TextBox 23"/>
+            <p:cNvSpPr txBox="1"/>
+            <p:nvPr/>
+          </p:nvSpPr>
+          <p:spPr>
+            <a:xfrm>
+              <a:off x="6715125" y="4573182"/>
+              <a:ext cx="5260687" cy="369332"/>
+            </a:xfrm>
+            <a:prstGeom prst="rect">
+              <a:avLst/>
+            </a:prstGeom>
+            <a:noFill/>
+          </p:spPr>
+          <p:txBody>
+            <a:bodyPr wrap="square" rtlCol="0">
+              <a:spAutoFit/>
+            </a:bodyPr>
+            <a:lstStyle/>
+            <a:p>
+              <a:pPr algn="ctr"/>
+              <a:r>
+                <a:rPr lang="de-CH" dirty="0"/>
+                <a:t>Prall (1997)</a:t>
+              </a:r>
+              <a:endParaRPr lang="en-US" dirty="0"/>
+            </a:p>
+          </p:txBody>
+        </p:sp>
+      </p:grpSp>
+      <p:pic>
+        <p:nvPicPr>
+          <p:cNvPr id="4" name="Picture 3"/>
+          <p:cNvPicPr>
+            <a:picLocks noChangeAspect="1"/>
+          </p:cNvPicPr>
+          <p:nvPr/>
+        </p:nvPicPr>
+        <p:blipFill>
+          <a:blip r:embed="rId4" cstate="print">
+            <a:extLst>
+              <a:ext uri="{28A0092B-C50C-407E-A947-70E740481C1C}">
+                <a14:useLocalDpi xmlns:a14="http://schemas.microsoft.com/office/drawing/2010/main" val="0"/>
+              </a:ext>
+            </a:extLst>
+          </a:blip>
+          <a:stretch>
+            <a:fillRect/>
+          </a:stretch>
+        </p:blipFill>
+        <p:spPr>
+          <a:xfrm>
+            <a:off x="1245341" y="3803349"/>
+            <a:ext cx="4274595" cy="2325747"/>
+          </a:xfrm>
+          <a:prstGeom prst="rect">
+            <a:avLst/>
+          </a:prstGeom>
+        </p:spPr>
+      </p:pic>
+      <p:pic>
+        <p:nvPicPr>
+          <p:cNvPr id="5" name="Picture 4"/>
+          <p:cNvPicPr>
+            <a:picLocks noChangeAspect="1"/>
+          </p:cNvPicPr>
+          <p:nvPr/>
+        </p:nvPicPr>
+        <p:blipFill>
+          <a:blip r:embed="rId5"/>
+          <a:stretch>
+            <a:fillRect/>
+          </a:stretch>
+        </p:blipFill>
+        <p:spPr>
+          <a:xfrm>
+            <a:off x="3592073" y="1191617"/>
+            <a:ext cx="2767116" cy="2101387"/>
+          </a:xfrm>
+          <a:prstGeom prst="rect">
+            <a:avLst/>
+          </a:prstGeom>
+        </p:spPr>
+      </p:pic>
     </p:spTree>
     <p:extLst>
       <p:ext uri="{BB962C8B-B14F-4D97-AF65-F5344CB8AC3E}">
-        <p14:creationId xmlns:p14="http://schemas.microsoft.com/office/powerpoint/2010/main" val="792181495"/>
+        <p14:creationId xmlns:p14="http://schemas.microsoft.com/office/powerpoint/2010/main" val="2985172584"/>
+      </p:ext>
+    </p:extLst>
+  </p:cSld>
+  <p:clrMapOvr>
+    <a:masterClrMapping/>
+  </p:clrMapOvr>
+</p:sld>
+</file>
+
+<file path=ppt/slides/slide5.xml><?xml version="1.0" encoding="utf-8"?>
+<p:sld xmlns:a="http://schemas.openxmlformats.org/drawingml/2006/main" xmlns:r="http://schemas.openxmlformats.org/officeDocument/2006/relationships" xmlns:p="http://schemas.openxmlformats.org/presentationml/2006/main">
+  <p:cSld>
+    <p:spTree>
+      <p:nvGrpSpPr>
+        <p:cNvPr id="1" name=""/>
+        <p:cNvGrpSpPr/>
+        <p:nvPr/>
+      </p:nvGrpSpPr>
+      <p:grpSpPr>
+        <a:xfrm>
+          <a:off x="0" y="0"/>
+          <a:ext cx="0" cy="0"/>
+          <a:chOff x="0" y="0"/>
+          <a:chExt cx="0" cy="0"/>
+        </a:xfrm>
+      </p:grpSpPr>
+      <p:sp>
+        <p:nvSpPr>
+          <p:cNvPr id="2" name="Text Placeholder 1"/>
+          <p:cNvSpPr>
+            <a:spLocks noGrp="1"/>
+          </p:cNvSpPr>
+          <p:nvPr>
+            <p:ph type="body" sz="quarter" idx="20"/>
+          </p:nvPr>
+        </p:nvSpPr>
+        <p:spPr/>
+        <p:txBody>
+          <a:bodyPr/>
+          <a:lstStyle/>
+          <a:p>
+            <a:r>
+              <a:rPr lang="es-ES" dirty="0" err="1"/>
+              <a:t>Analytical</a:t>
+            </a:r>
+            <a:r>
+              <a:rPr lang="es-ES" dirty="0"/>
+              <a:t> </a:t>
+            </a:r>
+            <a:r>
+              <a:rPr lang="es-ES" dirty="0" err="1"/>
+              <a:t>model</a:t>
+            </a:r>
+            <a:endParaRPr lang="es-ES" dirty="0"/>
+          </a:p>
+        </p:txBody>
+      </p:sp>
+      <p:pic>
+        <p:nvPicPr>
+          <p:cNvPr id="7" name="Picture 6"/>
+          <p:cNvPicPr>
+            <a:picLocks noChangeAspect="1"/>
+          </p:cNvPicPr>
+          <p:nvPr/>
+        </p:nvPicPr>
+        <p:blipFill rotWithShape="1">
+          <a:blip r:embed="rId2">
+            <a:extLst>
+              <a:ext uri="{28A0092B-C50C-407E-A947-70E740481C1C}">
+                <a14:useLocalDpi xmlns:a14="http://schemas.microsoft.com/office/drawing/2010/main" val="0"/>
+              </a:ext>
+            </a:extLst>
+          </a:blip>
+          <a:srcRect l="24536" t="17233" r="19176" b="23683"/>
+          <a:stretch/>
+        </p:blipFill>
+        <p:spPr>
+          <a:xfrm>
+            <a:off x="6812311" y="650559"/>
+            <a:ext cx="4324250" cy="2661076"/>
+          </a:xfrm>
+          <a:prstGeom prst="rect">
+            <a:avLst/>
+          </a:prstGeom>
+        </p:spPr>
+      </p:pic>
+      <p:pic>
+        <p:nvPicPr>
+          <p:cNvPr id="8" name="Picture 7"/>
+          <p:cNvPicPr>
+            <a:picLocks noChangeAspect="1"/>
+          </p:cNvPicPr>
+          <p:nvPr/>
+        </p:nvPicPr>
+        <p:blipFill>
+          <a:blip r:embed="rId3"/>
+          <a:stretch>
+            <a:fillRect/>
+          </a:stretch>
+        </p:blipFill>
+        <p:spPr>
+          <a:xfrm>
+            <a:off x="3105382" y="1162358"/>
+            <a:ext cx="3024336" cy="1044771"/>
+          </a:xfrm>
+          <a:prstGeom prst="rect">
+            <a:avLst/>
+          </a:prstGeom>
+        </p:spPr>
+      </p:pic>
+      <p:sp>
+        <p:nvSpPr>
+          <p:cNvPr id="12" name="TextBox 11"/>
+          <p:cNvSpPr txBox="1"/>
+          <p:nvPr/>
+        </p:nvSpPr>
+        <p:spPr>
+          <a:xfrm>
+            <a:off x="943325" y="1526559"/>
+            <a:ext cx="5260687" cy="1200329"/>
+          </a:xfrm>
+          <a:prstGeom prst="rect">
+            <a:avLst/>
+          </a:prstGeom>
+          <a:noFill/>
+        </p:spPr>
+        <p:txBody>
+          <a:bodyPr wrap="square" rtlCol="0">
+            <a:spAutoFit/>
+          </a:bodyPr>
+          <a:lstStyle/>
+          <a:p>
+            <a:pPr marL="285750" indent="-285750">
+              <a:buFontTx/>
+              <a:buChar char="-"/>
+            </a:pPr>
+            <a:r>
+              <a:rPr lang="de-CH" dirty="0"/>
+              <a:t>Bending:</a:t>
+            </a:r>
+          </a:p>
+          <a:p>
+            <a:pPr marL="285750" indent="-285750">
+              <a:buFontTx/>
+              <a:buChar char="-"/>
+            </a:pPr>
+            <a:endParaRPr lang="de-CH" dirty="0"/>
+          </a:p>
+          <a:p>
+            <a:pPr marL="285750" indent="-285750">
+              <a:buFontTx/>
+              <a:buChar char="-"/>
+            </a:pPr>
+            <a:endParaRPr lang="en-US" dirty="0"/>
+          </a:p>
+          <a:p>
+            <a:pPr marL="285750" indent="-285750">
+              <a:buFontTx/>
+              <a:buChar char="-"/>
+            </a:pPr>
+            <a:r>
+              <a:rPr lang="en-US" dirty="0"/>
+              <a:t>St. </a:t>
+            </a:r>
+            <a:r>
+              <a:rPr lang="en-US" dirty="0" err="1"/>
+              <a:t>Venant</a:t>
+            </a:r>
+            <a:r>
+              <a:rPr lang="en-US" dirty="0"/>
+              <a:t> torsion:</a:t>
+            </a:r>
+          </a:p>
+        </p:txBody>
+      </p:sp>
+      <p:pic>
+        <p:nvPicPr>
+          <p:cNvPr id="9" name="Picture 8"/>
+          <p:cNvPicPr>
+            <a:picLocks noChangeAspect="1"/>
+          </p:cNvPicPr>
+          <p:nvPr/>
+        </p:nvPicPr>
+        <p:blipFill>
+          <a:blip r:embed="rId4"/>
+          <a:stretch>
+            <a:fillRect/>
+          </a:stretch>
+        </p:blipFill>
+        <p:spPr>
+          <a:xfrm>
+            <a:off x="3265114" y="1988224"/>
+            <a:ext cx="2704872" cy="1064212"/>
+          </a:xfrm>
+          <a:prstGeom prst="rect">
+            <a:avLst/>
+          </a:prstGeom>
+        </p:spPr>
+      </p:pic>
+      <p:pic>
+        <p:nvPicPr>
+          <p:cNvPr id="10" name="Picture 9"/>
+          <p:cNvPicPr>
+            <a:picLocks noChangeAspect="1"/>
+          </p:cNvPicPr>
+          <p:nvPr/>
+        </p:nvPicPr>
+        <p:blipFill>
+          <a:blip r:embed="rId5" cstate="print">
+            <a:extLst>
+              <a:ext uri="{28A0092B-C50C-407E-A947-70E740481C1C}">
+                <a14:useLocalDpi xmlns:a14="http://schemas.microsoft.com/office/drawing/2010/main" val="0"/>
+              </a:ext>
+            </a:extLst>
+          </a:blip>
+          <a:stretch>
+            <a:fillRect/>
+          </a:stretch>
+        </p:blipFill>
+        <p:spPr>
+          <a:xfrm>
+            <a:off x="358342" y="3232299"/>
+            <a:ext cx="4873562" cy="2939816"/>
+          </a:xfrm>
+          <a:prstGeom prst="rect">
+            <a:avLst/>
+          </a:prstGeom>
+        </p:spPr>
+      </p:pic>
+      <p:pic>
+        <p:nvPicPr>
+          <p:cNvPr id="13" name="Picture 12"/>
+          <p:cNvPicPr>
+            <a:picLocks noChangeAspect="1"/>
+          </p:cNvPicPr>
+          <p:nvPr/>
+        </p:nvPicPr>
+        <p:blipFill>
+          <a:blip r:embed="rId6" cstate="print">
+            <a:extLst>
+              <a:ext uri="{28A0092B-C50C-407E-A947-70E740481C1C}">
+                <a14:useLocalDpi xmlns:a14="http://schemas.microsoft.com/office/drawing/2010/main" val="0"/>
+              </a:ext>
+            </a:extLst>
+          </a:blip>
+          <a:stretch>
+            <a:fillRect/>
+          </a:stretch>
+        </p:blipFill>
+        <p:spPr>
+          <a:xfrm>
+            <a:off x="6204012" y="3142438"/>
+            <a:ext cx="5171499" cy="3119537"/>
+          </a:xfrm>
+          <a:prstGeom prst="rect">
+            <a:avLst/>
+          </a:prstGeom>
+        </p:spPr>
+      </p:pic>
+    </p:spTree>
+    <p:extLst>
+      <p:ext uri="{BB962C8B-B14F-4D97-AF65-F5344CB8AC3E}">
+        <p14:creationId xmlns:p14="http://schemas.microsoft.com/office/powerpoint/2010/main" val="1420267620"/>
+      </p:ext>
+    </p:extLst>
+  </p:cSld>
+  <p:clrMapOvr>
+    <a:masterClrMapping/>
+  </p:clrMapOvr>
+</p:sld>
+</file>
+
+<file path=ppt/slides/slide6.xml><?xml version="1.0" encoding="utf-8"?>
+<p:sld xmlns:a="http://schemas.openxmlformats.org/drawingml/2006/main" xmlns:r="http://schemas.openxmlformats.org/officeDocument/2006/relationships" xmlns:p="http://schemas.openxmlformats.org/presentationml/2006/main">
+  <p:cSld>
+    <p:spTree>
+      <p:nvGrpSpPr>
+        <p:cNvPr id="1" name=""/>
+        <p:cNvGrpSpPr/>
+        <p:nvPr/>
+      </p:nvGrpSpPr>
+      <p:grpSpPr>
+        <a:xfrm>
+          <a:off x="0" y="0"/>
+          <a:ext cx="0" cy="0"/>
+          <a:chOff x="0" y="0"/>
+          <a:chExt cx="0" cy="0"/>
+        </a:xfrm>
+      </p:grpSpPr>
+      <p:sp>
+        <p:nvSpPr>
+          <p:cNvPr id="2" name="Text Placeholder 1"/>
+          <p:cNvSpPr>
+            <a:spLocks noGrp="1"/>
+          </p:cNvSpPr>
+          <p:nvPr>
+            <p:ph type="body" sz="quarter" idx="20"/>
+          </p:nvPr>
+        </p:nvSpPr>
+        <p:spPr/>
+        <p:txBody>
+          <a:bodyPr/>
+          <a:lstStyle/>
+          <a:p>
+            <a:r>
+              <a:rPr lang="es-ES" dirty="0" err="1"/>
+              <a:t>Wing</a:t>
+            </a:r>
+            <a:r>
+              <a:rPr lang="es-ES" dirty="0"/>
+              <a:t> box </a:t>
+            </a:r>
+            <a:r>
+              <a:rPr lang="es-ES" dirty="0" err="1"/>
+              <a:t>model</a:t>
+            </a:r>
+            <a:r>
+              <a:rPr lang="es-ES" dirty="0"/>
+              <a:t> </a:t>
+            </a:r>
+            <a:r>
+              <a:rPr lang="es-ES" dirty="0" err="1"/>
+              <a:t>overview</a:t>
+            </a:r>
+            <a:endParaRPr lang="es-ES" dirty="0"/>
+          </a:p>
+        </p:txBody>
+      </p:sp>
+      <p:sp>
+        <p:nvSpPr>
+          <p:cNvPr id="7" name="TextBox 6"/>
+          <p:cNvSpPr txBox="1"/>
+          <p:nvPr/>
+        </p:nvSpPr>
+        <p:spPr>
+          <a:xfrm>
+            <a:off x="7233249" y="886253"/>
+            <a:ext cx="3476847" cy="369332"/>
+          </a:xfrm>
+          <a:prstGeom prst="rect">
+            <a:avLst/>
+          </a:prstGeom>
+          <a:noFill/>
+        </p:spPr>
+        <p:txBody>
+          <a:bodyPr wrap="square" rtlCol="0">
+            <a:spAutoFit/>
+          </a:bodyPr>
+          <a:lstStyle/>
+          <a:p>
+            <a:pPr algn="ctr"/>
+            <a:r>
+              <a:rPr lang="de-CH" dirty="0"/>
+              <a:t>Abaqus model with mesh</a:t>
+            </a:r>
+            <a:endParaRPr lang="en-US" dirty="0"/>
+          </a:p>
+        </p:txBody>
+      </p:sp>
+      <p:pic>
+        <p:nvPicPr>
+          <p:cNvPr id="8" name="Picture 7"/>
+          <p:cNvPicPr>
+            <a:picLocks noChangeAspect="1"/>
+          </p:cNvPicPr>
+          <p:nvPr/>
+        </p:nvPicPr>
+        <p:blipFill>
+          <a:blip r:embed="rId2" cstate="print">
+            <a:extLst>
+              <a:ext uri="{28A0092B-C50C-407E-A947-70E740481C1C}">
+                <a14:useLocalDpi xmlns:a14="http://schemas.microsoft.com/office/drawing/2010/main" val="0"/>
+              </a:ext>
+            </a:extLst>
+          </a:blip>
+          <a:stretch>
+            <a:fillRect/>
+          </a:stretch>
+        </p:blipFill>
+        <p:spPr>
+          <a:xfrm>
+            <a:off x="6187740" y="1354247"/>
+            <a:ext cx="5567867" cy="2686383"/>
+          </a:xfrm>
+          <a:prstGeom prst="rect">
+            <a:avLst/>
+          </a:prstGeom>
+        </p:spPr>
+      </p:pic>
+      <p:sp>
+        <p:nvSpPr>
+          <p:cNvPr id="9" name="TextBox 8"/>
+          <p:cNvSpPr txBox="1"/>
+          <p:nvPr/>
+        </p:nvSpPr>
+        <p:spPr>
+          <a:xfrm>
+            <a:off x="626266" y="1382825"/>
+            <a:ext cx="5571052" cy="4801314"/>
+          </a:xfrm>
+          <a:prstGeom prst="rect">
+            <a:avLst/>
+          </a:prstGeom>
+          <a:noFill/>
+        </p:spPr>
+        <p:txBody>
+          <a:bodyPr wrap="square" rtlCol="0">
+            <a:spAutoFit/>
+          </a:bodyPr>
+          <a:lstStyle/>
+          <a:p>
+            <a:pPr marL="285750" indent="-285750">
+              <a:buFont typeface="Arial" pitchFamily="34" charset="0"/>
+              <a:buChar char="•"/>
+            </a:pPr>
+            <a:r>
+              <a:rPr lang="es-ES" dirty="0"/>
+              <a:t>Script </a:t>
+            </a:r>
+            <a:r>
+              <a:rPr lang="es-ES" dirty="0" err="1"/>
+              <a:t>developed</a:t>
+            </a:r>
+            <a:r>
+              <a:rPr lang="es-ES" dirty="0"/>
+              <a:t> in </a:t>
+            </a:r>
+            <a:r>
+              <a:rPr lang="es-ES" dirty="0" err="1"/>
+              <a:t>Python</a:t>
+            </a:r>
+            <a:br>
+              <a:rPr lang="es-ES" dirty="0"/>
+            </a:br>
+            <a:endParaRPr lang="en-US" dirty="0"/>
+          </a:p>
+          <a:p>
+            <a:pPr marL="285750" indent="-285750">
+              <a:buFont typeface="Arial" pitchFamily="34" charset="0"/>
+              <a:buChar char="•"/>
+            </a:pPr>
+            <a:r>
+              <a:rPr lang="en-US" dirty="0"/>
+              <a:t>Fully parameterized</a:t>
+            </a:r>
+            <a:br>
+              <a:rPr lang="en-US" dirty="0"/>
+            </a:br>
+            <a:endParaRPr lang="en-US" dirty="0"/>
+          </a:p>
+          <a:p>
+            <a:pPr marL="285750" indent="-285750">
+              <a:buFont typeface="Arial" pitchFamily="34" charset="0"/>
+              <a:buChar char="•"/>
+            </a:pPr>
+            <a:r>
+              <a:rPr lang="en-US" dirty="0"/>
+              <a:t>Parameter study, with 5 variable parameters</a:t>
+            </a:r>
+          </a:p>
+          <a:p>
+            <a:pPr marL="742950" lvl="1" indent="-285750">
+              <a:buFont typeface="Arial" pitchFamily="34" charset="0"/>
+              <a:buChar char="•"/>
+            </a:pPr>
+            <a:r>
+              <a:rPr lang="es-ES" dirty="0"/>
+              <a:t>C-box </a:t>
+            </a:r>
+            <a:r>
+              <a:rPr lang="es-ES" dirty="0" err="1"/>
+              <a:t>thickness</a:t>
+            </a:r>
+            <a:endParaRPr lang="es-ES" dirty="0"/>
+          </a:p>
+          <a:p>
+            <a:pPr marL="742950" lvl="1" indent="-285750">
+              <a:buFont typeface="Arial" pitchFamily="34" charset="0"/>
+              <a:buChar char="•"/>
+            </a:pPr>
+            <a:r>
+              <a:rPr lang="es-ES" dirty="0" err="1"/>
+              <a:t>Rib</a:t>
+            </a:r>
+            <a:r>
+              <a:rPr lang="es-ES" dirty="0"/>
+              <a:t> </a:t>
+            </a:r>
+            <a:r>
+              <a:rPr lang="es-ES" dirty="0" err="1"/>
+              <a:t>thickness</a:t>
+            </a:r>
+            <a:endParaRPr lang="es-ES" dirty="0"/>
+          </a:p>
+          <a:p>
+            <a:pPr marL="742950" lvl="1" indent="-285750">
+              <a:buFont typeface="Arial" pitchFamily="34" charset="0"/>
+              <a:buChar char="•"/>
+            </a:pPr>
+            <a:r>
+              <a:rPr lang="es-ES" dirty="0" err="1"/>
+              <a:t>Rib</a:t>
+            </a:r>
+            <a:r>
+              <a:rPr lang="es-ES" dirty="0"/>
+              <a:t> </a:t>
+            </a:r>
+            <a:r>
+              <a:rPr lang="es-ES" dirty="0" err="1"/>
+              <a:t>frame</a:t>
+            </a:r>
+            <a:r>
+              <a:rPr lang="es-ES" dirty="0"/>
+              <a:t> </a:t>
+            </a:r>
+            <a:r>
+              <a:rPr lang="es-ES" dirty="0" err="1"/>
+              <a:t>width</a:t>
+            </a:r>
+            <a:endParaRPr lang="es-ES" dirty="0"/>
+          </a:p>
+          <a:p>
+            <a:pPr marL="742950" lvl="1" indent="-285750">
+              <a:buFont typeface="Arial" pitchFamily="34" charset="0"/>
+              <a:buChar char="•"/>
+            </a:pPr>
+            <a:r>
+              <a:rPr lang="es-ES" noProof="1"/>
+              <a:t>Chiral ligament eccentricity</a:t>
+            </a:r>
+          </a:p>
+          <a:p>
+            <a:pPr marL="742950" lvl="1" indent="-285750">
+              <a:buFont typeface="Arial" pitchFamily="34" charset="0"/>
+              <a:buChar char="•"/>
+            </a:pPr>
+            <a:r>
+              <a:rPr lang="es-ES" noProof="1"/>
+              <a:t>Chiral section thickness</a:t>
+            </a:r>
+            <a:br>
+              <a:rPr lang="es-ES" noProof="1"/>
+            </a:br>
+            <a:endParaRPr lang="es-ES" noProof="1"/>
+          </a:p>
+          <a:p>
+            <a:pPr marL="285750" indent="-285750">
+              <a:buFont typeface="Arial" pitchFamily="34" charset="0"/>
+              <a:buChar char="•"/>
+            </a:pPr>
+            <a:r>
+              <a:rPr lang="es-ES" noProof="1"/>
+              <a:t>Length in the spanwise dimension: 1m</a:t>
+            </a:r>
+          </a:p>
+          <a:p>
+            <a:pPr marL="742950" lvl="1" indent="-285750">
+              <a:buFont typeface="Arial" pitchFamily="34" charset="0"/>
+              <a:buChar char="•"/>
+            </a:pPr>
+            <a:endParaRPr lang="es-ES" noProof="1"/>
+          </a:p>
+          <a:p>
+            <a:pPr marL="285750" indent="-285750">
+              <a:buFont typeface="Arial" pitchFamily="34" charset="0"/>
+              <a:buChar char="•"/>
+            </a:pPr>
+            <a:r>
+              <a:rPr lang="es-ES" noProof="1"/>
+              <a:t>Fixed support at the wing root</a:t>
+            </a:r>
+          </a:p>
+          <a:p>
+            <a:pPr marL="285750" indent="-285750">
+              <a:buFont typeface="Arial" pitchFamily="34" charset="0"/>
+              <a:buChar char="•"/>
+            </a:pPr>
+            <a:endParaRPr lang="es-ES" noProof="1"/>
+          </a:p>
+          <a:p>
+            <a:pPr marL="285750" indent="-285750">
+              <a:buFont typeface="Arial" pitchFamily="34" charset="0"/>
+              <a:buChar char="•"/>
+            </a:pPr>
+            <a:r>
+              <a:rPr lang="es-ES" noProof="1"/>
+              <a:t>Various load introduction strategies</a:t>
+            </a:r>
+            <a:br>
+              <a:rPr lang="es-ES" noProof="1"/>
+            </a:br>
+            <a:endParaRPr lang="es-ES" noProof="1"/>
+          </a:p>
+        </p:txBody>
+      </p:sp>
+      <p:pic>
+        <p:nvPicPr>
+          <p:cNvPr id="10" name="Picture 9"/>
+          <p:cNvPicPr>
+            <a:picLocks noChangeAspect="1"/>
+          </p:cNvPicPr>
+          <p:nvPr/>
+        </p:nvPicPr>
+        <p:blipFill rotWithShape="1">
+          <a:blip r:embed="rId3">
+            <a:extLst>
+              <a:ext uri="{28A0092B-C50C-407E-A947-70E740481C1C}">
+                <a14:useLocalDpi xmlns:a14="http://schemas.microsoft.com/office/drawing/2010/main" val="0"/>
+              </a:ext>
+            </a:extLst>
+          </a:blip>
+          <a:srcRect l="18248" t="19954" r="11989" b="5599"/>
+          <a:stretch/>
+        </p:blipFill>
+        <p:spPr>
+          <a:xfrm>
+            <a:off x="6315535" y="3928141"/>
+            <a:ext cx="4636000" cy="2380585"/>
+          </a:xfrm>
+          <a:prstGeom prst="rect">
+            <a:avLst/>
+          </a:prstGeom>
+        </p:spPr>
+      </p:pic>
+    </p:spTree>
+    <p:extLst>
+      <p:ext uri="{BB962C8B-B14F-4D97-AF65-F5344CB8AC3E}">
+        <p14:creationId xmlns:p14="http://schemas.microsoft.com/office/powerpoint/2010/main" val="1514877584"/>
+      </p:ext>
+    </p:extLst>
+  </p:cSld>
+  <p:clrMapOvr>
+    <a:masterClrMapping/>
+  </p:clrMapOvr>
+</p:sld>
+</file>
+
+<file path=ppt/slides/slide7.xml><?xml version="1.0" encoding="utf-8"?>
+<p:sld xmlns:a="http://schemas.openxmlformats.org/drawingml/2006/main" xmlns:r="http://schemas.openxmlformats.org/officeDocument/2006/relationships" xmlns:p="http://schemas.openxmlformats.org/presentationml/2006/main">
+  <p:cSld>
+    <p:spTree>
+      <p:nvGrpSpPr>
+        <p:cNvPr id="1" name=""/>
+        <p:cNvGrpSpPr/>
+        <p:nvPr/>
+      </p:nvGrpSpPr>
+      <p:grpSpPr>
+        <a:xfrm>
+          <a:off x="0" y="0"/>
+          <a:ext cx="0" cy="0"/>
+          <a:chOff x="0" y="0"/>
+          <a:chExt cx="0" cy="0"/>
+        </a:xfrm>
+      </p:grpSpPr>
+      <p:sp>
+        <p:nvSpPr>
+          <p:cNvPr id="2" name="Text Placeholder 1"/>
+          <p:cNvSpPr>
+            <a:spLocks noGrp="1"/>
+          </p:cNvSpPr>
+          <p:nvPr>
+            <p:ph type="body" sz="quarter" idx="20"/>
+          </p:nvPr>
+        </p:nvSpPr>
+        <p:spPr/>
+        <p:txBody>
+          <a:bodyPr/>
+          <a:lstStyle/>
+          <a:p>
+            <a:r>
+              <a:rPr lang="es-ES" dirty="0" err="1"/>
+              <a:t>Wing</a:t>
+            </a:r>
+            <a:r>
+              <a:rPr lang="es-ES" dirty="0"/>
+              <a:t> box </a:t>
+            </a:r>
+            <a:r>
+              <a:rPr lang="es-ES" dirty="0" err="1"/>
+              <a:t>nonlinear</a:t>
+            </a:r>
+            <a:r>
+              <a:rPr lang="es-ES" dirty="0"/>
+              <a:t> </a:t>
+            </a:r>
+            <a:r>
+              <a:rPr lang="es-ES" dirty="0" err="1"/>
+              <a:t>simulations</a:t>
+            </a:r>
+            <a:r>
+              <a:rPr lang="es-ES" dirty="0"/>
+              <a:t> </a:t>
+            </a:r>
+            <a:r>
+              <a:rPr lang="es-ES" dirty="0" err="1"/>
+              <a:t>results</a:t>
+            </a:r>
+            <a:endParaRPr lang="es-ES" dirty="0"/>
+          </a:p>
+        </p:txBody>
+      </p:sp>
+      <p:sp>
+        <p:nvSpPr>
+          <p:cNvPr id="7" name="TextBox 6"/>
+          <p:cNvSpPr txBox="1"/>
+          <p:nvPr/>
+        </p:nvSpPr>
+        <p:spPr>
+          <a:xfrm>
+            <a:off x="695400" y="1412776"/>
+            <a:ext cx="5400600" cy="369332"/>
+          </a:xfrm>
+          <a:prstGeom prst="rect">
+            <a:avLst/>
+          </a:prstGeom>
+          <a:noFill/>
+        </p:spPr>
+        <p:txBody>
+          <a:bodyPr wrap="square" rtlCol="0">
+            <a:spAutoFit/>
+          </a:bodyPr>
+          <a:lstStyle/>
+          <a:p>
+            <a:r>
+              <a:rPr lang="de-CH" dirty="0"/>
+              <a:t>Single load introduction point on last rib</a:t>
+            </a:r>
+            <a:endParaRPr lang="en-US" dirty="0"/>
+          </a:p>
+        </p:txBody>
+      </p:sp>
+      <p:pic>
+        <p:nvPicPr>
+          <p:cNvPr id="4" name="Picture 3"/>
+          <p:cNvPicPr>
+            <a:picLocks noChangeAspect="1"/>
+          </p:cNvPicPr>
+          <p:nvPr/>
+        </p:nvPicPr>
+        <p:blipFill>
+          <a:blip r:embed="rId2">
+            <a:extLst>
+              <a:ext uri="{28A0092B-C50C-407E-A947-70E740481C1C}">
+                <a14:useLocalDpi xmlns:a14="http://schemas.microsoft.com/office/drawing/2010/main" val="0"/>
+              </a:ext>
+            </a:extLst>
+          </a:blip>
+          <a:stretch>
+            <a:fillRect/>
+          </a:stretch>
+        </p:blipFill>
+        <p:spPr>
+          <a:xfrm>
+            <a:off x="2351584" y="1921865"/>
+            <a:ext cx="7776864" cy="4421524"/>
+          </a:xfrm>
+          <a:prstGeom prst="rect">
+            <a:avLst/>
+          </a:prstGeom>
+        </p:spPr>
+      </p:pic>
+    </p:spTree>
+    <p:extLst>
+      <p:ext uri="{BB962C8B-B14F-4D97-AF65-F5344CB8AC3E}">
+        <p14:creationId xmlns:p14="http://schemas.microsoft.com/office/powerpoint/2010/main" val="3813847900"/>
+      </p:ext>
+    </p:extLst>
+  </p:cSld>
+  <p:clrMapOvr>
+    <a:masterClrMapping/>
+  </p:clrMapOvr>
+</p:sld>
+</file>
+
+<file path=ppt/slides/slide8.xml><?xml version="1.0" encoding="utf-8"?>
+<p:sld xmlns:a="http://schemas.openxmlformats.org/drawingml/2006/main" xmlns:r="http://schemas.openxmlformats.org/officeDocument/2006/relationships" xmlns:p="http://schemas.openxmlformats.org/presentationml/2006/main">
+  <p:cSld>
+    <p:spTree>
+      <p:nvGrpSpPr>
+        <p:cNvPr id="1" name=""/>
+        <p:cNvGrpSpPr/>
+        <p:nvPr/>
+      </p:nvGrpSpPr>
+      <p:grpSpPr>
+        <a:xfrm>
+          <a:off x="0" y="0"/>
+          <a:ext cx="0" cy="0"/>
+          <a:chOff x="0" y="0"/>
+          <a:chExt cx="0" cy="0"/>
+        </a:xfrm>
+      </p:grpSpPr>
+      <p:sp>
+        <p:nvSpPr>
+          <p:cNvPr id="2" name="Text Placeholder 1"/>
+          <p:cNvSpPr>
+            <a:spLocks noGrp="1"/>
+          </p:cNvSpPr>
+          <p:nvPr>
+            <p:ph type="body" sz="quarter" idx="20"/>
+          </p:nvPr>
+        </p:nvSpPr>
+        <p:spPr/>
+        <p:txBody>
+          <a:bodyPr/>
+          <a:lstStyle/>
+          <a:p>
+            <a:r>
+              <a:rPr lang="es-ES" dirty="0" err="1"/>
+              <a:t>Wing</a:t>
+            </a:r>
+            <a:r>
+              <a:rPr lang="es-ES" dirty="0"/>
+              <a:t> box </a:t>
+            </a:r>
+            <a:r>
+              <a:rPr lang="es-ES" dirty="0" err="1"/>
+              <a:t>nonlinear</a:t>
+            </a:r>
+            <a:r>
+              <a:rPr lang="es-ES" dirty="0"/>
+              <a:t> </a:t>
+            </a:r>
+            <a:r>
+              <a:rPr lang="es-ES" dirty="0" err="1"/>
+              <a:t>simulations</a:t>
+            </a:r>
+            <a:r>
+              <a:rPr lang="es-ES" dirty="0"/>
+              <a:t> </a:t>
+            </a:r>
+            <a:r>
+              <a:rPr lang="es-ES" dirty="0" err="1"/>
+              <a:t>results</a:t>
+            </a:r>
+            <a:endParaRPr lang="es-ES" dirty="0"/>
+          </a:p>
+        </p:txBody>
+      </p:sp>
+      <p:sp>
+        <p:nvSpPr>
+          <p:cNvPr id="7" name="TextBox 6"/>
+          <p:cNvSpPr txBox="1"/>
+          <p:nvPr/>
+        </p:nvSpPr>
+        <p:spPr>
+          <a:xfrm>
+            <a:off x="695400" y="1412776"/>
+            <a:ext cx="5400600" cy="369332"/>
+          </a:xfrm>
+          <a:prstGeom prst="rect">
+            <a:avLst/>
+          </a:prstGeom>
+          <a:noFill/>
+        </p:spPr>
+        <p:txBody>
+          <a:bodyPr wrap="square" rtlCol="0">
+            <a:spAutoFit/>
+          </a:bodyPr>
+          <a:lstStyle/>
+          <a:p>
+            <a:r>
+              <a:rPr lang="de-CH" dirty="0"/>
+              <a:t>Multiple load introduction points on inner ribs</a:t>
+            </a:r>
+            <a:endParaRPr lang="en-US" dirty="0"/>
+          </a:p>
+        </p:txBody>
+      </p:sp>
+      <p:pic>
+        <p:nvPicPr>
+          <p:cNvPr id="4" name="Picture 3"/>
+          <p:cNvPicPr>
+            <a:picLocks noChangeAspect="1"/>
+          </p:cNvPicPr>
+          <p:nvPr/>
+        </p:nvPicPr>
+        <p:blipFill>
+          <a:blip r:embed="rId2">
+            <a:extLst>
+              <a:ext uri="{28A0092B-C50C-407E-A947-70E740481C1C}">
+                <a14:useLocalDpi xmlns:a14="http://schemas.microsoft.com/office/drawing/2010/main" val="0"/>
+              </a:ext>
+            </a:extLst>
+          </a:blip>
+          <a:stretch>
+            <a:fillRect/>
+          </a:stretch>
+        </p:blipFill>
+        <p:spPr>
+          <a:xfrm>
+            <a:off x="2351584" y="1921865"/>
+            <a:ext cx="7776864" cy="4421523"/>
+          </a:xfrm>
+          <a:prstGeom prst="rect">
+            <a:avLst/>
+          </a:prstGeom>
+        </p:spPr>
+      </p:pic>
+    </p:spTree>
+    <p:extLst>
+      <p:ext uri="{BB962C8B-B14F-4D97-AF65-F5344CB8AC3E}">
+        <p14:creationId xmlns:p14="http://schemas.microsoft.com/office/powerpoint/2010/main" val="3539386742"/>
+      </p:ext>
+    </p:extLst>
+  </p:cSld>
+  <p:clrMapOvr>
+    <a:masterClrMapping/>
+  </p:clrMapOvr>
+</p:sld>
+</file>
+
+<file path=ppt/slides/slide9.xml><?xml version="1.0" encoding="utf-8"?>
+<p:sld xmlns:a="http://schemas.openxmlformats.org/drawingml/2006/main" xmlns:r="http://schemas.openxmlformats.org/officeDocument/2006/relationships" xmlns:p="http://schemas.openxmlformats.org/presentationml/2006/main">
+  <p:cSld>
+    <p:spTree>
+      <p:nvGrpSpPr>
+        <p:cNvPr id="1" name=""/>
+        <p:cNvGrpSpPr/>
+        <p:nvPr/>
+      </p:nvGrpSpPr>
+      <p:grpSpPr>
+        <a:xfrm>
+          <a:off x="0" y="0"/>
+          <a:ext cx="0" cy="0"/>
+          <a:chOff x="0" y="0"/>
+          <a:chExt cx="0" cy="0"/>
+        </a:xfrm>
+      </p:grpSpPr>
+      <p:sp>
+        <p:nvSpPr>
+          <p:cNvPr id="2" name="Text Placeholder 1"/>
+          <p:cNvSpPr>
+            <a:spLocks noGrp="1"/>
+          </p:cNvSpPr>
+          <p:nvPr>
+            <p:ph type="body" sz="quarter" idx="20"/>
+          </p:nvPr>
+        </p:nvSpPr>
+        <p:spPr/>
+        <p:txBody>
+          <a:bodyPr/>
+          <a:lstStyle/>
+          <a:p>
+            <a:r>
+              <a:rPr lang="es-ES" dirty="0" err="1"/>
+              <a:t>Wing</a:t>
+            </a:r>
+            <a:r>
+              <a:rPr lang="es-ES" dirty="0"/>
+              <a:t> box </a:t>
+            </a:r>
+            <a:r>
+              <a:rPr lang="es-ES" dirty="0" err="1"/>
+              <a:t>nonlinear</a:t>
+            </a:r>
+            <a:r>
+              <a:rPr lang="es-ES" dirty="0"/>
+              <a:t> </a:t>
+            </a:r>
+            <a:r>
+              <a:rPr lang="es-ES" dirty="0" err="1"/>
+              <a:t>simulations</a:t>
+            </a:r>
+            <a:r>
+              <a:rPr lang="es-ES" dirty="0"/>
+              <a:t> </a:t>
+            </a:r>
+            <a:r>
+              <a:rPr lang="es-ES" dirty="0" err="1"/>
+              <a:t>results</a:t>
+            </a:r>
+            <a:endParaRPr lang="es-ES" dirty="0"/>
+          </a:p>
+        </p:txBody>
+      </p:sp>
+      <p:sp>
+        <p:nvSpPr>
+          <p:cNvPr id="7" name="TextBox 6"/>
+          <p:cNvSpPr txBox="1"/>
+          <p:nvPr/>
+        </p:nvSpPr>
+        <p:spPr>
+          <a:xfrm>
+            <a:off x="695400" y="1412776"/>
+            <a:ext cx="6192688" cy="369332"/>
+          </a:xfrm>
+          <a:prstGeom prst="rect">
+            <a:avLst/>
+          </a:prstGeom>
+          <a:noFill/>
+        </p:spPr>
+        <p:txBody>
+          <a:bodyPr wrap="square" rtlCol="0">
+            <a:spAutoFit/>
+          </a:bodyPr>
+          <a:lstStyle/>
+          <a:p>
+            <a:r>
+              <a:rPr lang="de-CH" dirty="0"/>
+              <a:t>Beam twist evolution with the fraction of load applied</a:t>
+            </a:r>
+            <a:endParaRPr lang="en-US" dirty="0"/>
+          </a:p>
+        </p:txBody>
+      </p:sp>
+      <p:pic>
+        <p:nvPicPr>
+          <p:cNvPr id="4" name="Picture 3"/>
+          <p:cNvPicPr>
+            <a:picLocks noChangeAspect="1"/>
+          </p:cNvPicPr>
+          <p:nvPr/>
+        </p:nvPicPr>
+        <p:blipFill>
+          <a:blip r:embed="rId2">
+            <a:extLst>
+              <a:ext uri="{28A0092B-C50C-407E-A947-70E740481C1C}">
+                <a14:useLocalDpi xmlns:a14="http://schemas.microsoft.com/office/drawing/2010/main" val="0"/>
+              </a:ext>
+            </a:extLst>
+          </a:blip>
+          <a:stretch>
+            <a:fillRect/>
+          </a:stretch>
+        </p:blipFill>
+        <p:spPr>
+          <a:xfrm>
+            <a:off x="2351584" y="1761561"/>
+            <a:ext cx="7513971" cy="4581828"/>
+          </a:xfrm>
+          <a:prstGeom prst="rect">
+            <a:avLst/>
+          </a:prstGeom>
+        </p:spPr>
+      </p:pic>
+    </p:spTree>
+    <p:extLst>
+      <p:ext uri="{BB962C8B-B14F-4D97-AF65-F5344CB8AC3E}">
+        <p14:creationId xmlns:p14="http://schemas.microsoft.com/office/powerpoint/2010/main" val="3265074744"/>
       </p:ext>
     </p:extLst>
   </p:cSld>
@@ -6755,12 +9298,6 @@
 </file>
 
 <file path=customXml/item1.xml><?xml version="1.0" encoding="utf-8"?>
-<p:properties xmlns:p="http://schemas.microsoft.com/office/2006/metadata/properties" xmlns:xsi="http://www.w3.org/2001/XMLSchema-instance" xmlns:pc="http://schemas.microsoft.com/office/infopath/2007/PartnerControls">
-  <documentManagement/>
-</p:properties>
-</file>
-
-<file path=customXml/item2.xml><?xml version="1.0" encoding="utf-8"?>
 <ct:contentTypeSchema xmlns:ct="http://schemas.microsoft.com/office/2006/metadata/contentType" xmlns:ma="http://schemas.microsoft.com/office/2006/metadata/properties/metaAttributes" ct:_="" ma:_="" ma:contentTypeName="Document" ma:contentTypeID="0x01010029F9A780F40D6D43967DF6A0E4BBBC14" ma:contentTypeVersion="3" ma:contentTypeDescription="Create a new document." ma:contentTypeScope="" ma:versionID="46084dd6e4eb7f4e55e22b01662baf7b">
   <xsd:schema xmlns:xsd="http://www.w3.org/2001/XMLSchema" xmlns:xs="http://www.w3.org/2001/XMLSchema" xmlns:p="http://schemas.microsoft.com/office/2006/metadata/properties" targetNamespace="http://schemas.microsoft.com/office/2006/metadata/properties" ma:root="true" ma:fieldsID="8022916f55ab85163ee9a5069dec31d5">
     <xsd:element name="properties">
@@ -6874,6 +9411,12 @@
 </ct:contentTypeSchema>
 </file>
 
+<file path=customXml/item2.xml><?xml version="1.0" encoding="utf-8"?>
+<p:properties xmlns:p="http://schemas.microsoft.com/office/2006/metadata/properties" xmlns:xsi="http://www.w3.org/2001/XMLSchema-instance" xmlns:pc="http://schemas.microsoft.com/office/infopath/2007/PartnerControls">
+  <documentManagement/>
+</p:properties>
+</file>
+
 <file path=customXml/item3.xml><?xml version="1.0" encoding="utf-8"?>
 <?mso-contentType ?>
 <FormTemplates xmlns="http://schemas.microsoft.com/sharepoint/v3/contenttype/forms">
@@ -6884,15 +9427,6 @@
 </file>
 
 <file path=customXml/itemProps1.xml><?xml version="1.0" encoding="utf-8"?>
-<ds:datastoreItem xmlns:ds="http://schemas.openxmlformats.org/officeDocument/2006/customXml" ds:itemID="{6429D86A-3AF6-48A4-855F-0A95E6AF055E}">
-  <ds:schemaRefs>
-    <ds:schemaRef ds:uri="http://schemas.microsoft.com/office/2006/metadata/properties"/>
-    <ds:schemaRef ds:uri="http://schemas.microsoft.com/office/infopath/2007/PartnerControls"/>
-  </ds:schemaRefs>
-</ds:datastoreItem>
-</file>
-
-<file path=customXml/itemProps2.xml><?xml version="1.0" encoding="utf-8"?>
 <ds:datastoreItem xmlns:ds="http://schemas.openxmlformats.org/officeDocument/2006/customXml" ds:itemID="{7DD48CA2-582A-4403-B04A-9D1525385275}">
   <ds:schemaRefs>
     <ds:schemaRef ds:uri="http://schemas.microsoft.com/office/2006/metadata/contentType"/>
@@ -6908,6 +9442,21 @@
 </ds:datastoreItem>
 </file>
 
+<file path=customXml/itemProps2.xml><?xml version="1.0" encoding="utf-8"?>
+<ds:datastoreItem xmlns:ds="http://schemas.openxmlformats.org/officeDocument/2006/customXml" ds:itemID="{6429D86A-3AF6-48A4-855F-0A95E6AF055E}">
+  <ds:schemaRefs>
+    <ds:schemaRef ds:uri="http://purl.org/dc/dcmitype/"/>
+    <ds:schemaRef ds:uri="http://schemas.microsoft.com/office/infopath/2007/PartnerControls"/>
+    <ds:schemaRef ds:uri="http://purl.org/dc/elements/1.1/"/>
+    <ds:schemaRef ds:uri="http://schemas.microsoft.com/office/2006/metadata/properties"/>
+    <ds:schemaRef ds:uri="http://schemas.microsoft.com/office/2006/documentManagement/types"/>
+    <ds:schemaRef ds:uri="http://purl.org/dc/terms/"/>
+    <ds:schemaRef ds:uri="http://schemas.openxmlformats.org/package/2006/metadata/core-properties"/>
+    <ds:schemaRef ds:uri="http://www.w3.org/XML/1998/namespace"/>
+  </ds:schemaRefs>
+</ds:datastoreItem>
+</file>
+
 <file path=customXml/itemProps3.xml><?xml version="1.0" encoding="utf-8"?>
 <ds:datastoreItem xmlns:ds="http://schemas.openxmlformats.org/officeDocument/2006/customXml" ds:itemID="{8F2FDF69-5A1A-4E32-A5EE-49837B61342A}">
   <ds:schemaRefs>

</xml_diff>

<commit_message>
Slide showing the project status added
</commit_message>
<xml_diff>
--- a/Presentation_OstfaliaUni.pptx
+++ b/Presentation_OstfaliaUni.pptx
@@ -6,10 +6,10 @@
     <p:sldMasterId id="2147483745" r:id="rId5"/>
   </p:sldMasterIdLst>
   <p:notesMasterIdLst>
-    <p:notesMasterId r:id="rId17"/>
+    <p:notesMasterId r:id="rId18"/>
   </p:notesMasterIdLst>
   <p:handoutMasterIdLst>
-    <p:handoutMasterId r:id="rId18"/>
+    <p:handoutMasterId r:id="rId19"/>
   </p:handoutMasterIdLst>
   <p:sldIdLst>
     <p:sldId id="256" r:id="rId6"/>
@@ -22,7 +22,8 @@
     <p:sldId id="266" r:id="rId13"/>
     <p:sldId id="268" r:id="rId14"/>
     <p:sldId id="267" r:id="rId15"/>
-    <p:sldId id="260" r:id="rId16"/>
+    <p:sldId id="269" r:id="rId16"/>
+    <p:sldId id="260" r:id="rId17"/>
   </p:sldIdLst>
   <p:sldSz cx="12192000" cy="6858000"/>
   <p:notesSz cx="6797675" cy="9928225"/>
@@ -248,7 +249,7 @@
                 <a:ea typeface="Arial" charset="0"/>
                 <a:cs typeface="Arial" charset="0"/>
               </a:rPr>
-              <a:t>07/07/2017</a:t>
+              <a:t>08/07/2017</a:t>
             </a:fld>
             <a:endParaRPr lang="en-GB" dirty="0">
               <a:latin typeface="Arial" charset="0"/>
@@ -429,7 +430,7 @@
           <a:p>
             <a:fld id="{463CE1C2-7DC9-FC47-9848-69281FD2BD18}" type="datetimeFigureOut">
               <a:rPr lang="en-US" smtClean="0"/>
-              <a:t>7/7/2017</a:t>
+              <a:t>7/8/2017</a:t>
             </a:fld>
             <a:endParaRPr lang="en-US"/>
           </a:p>
@@ -5960,6 +5961,232 @@
 </file>
 
 <file path=ppt/slides/slide11.xml><?xml version="1.0" encoding="utf-8"?>
+<p:sld xmlns:a="http://schemas.openxmlformats.org/drawingml/2006/main" xmlns:r="http://schemas.openxmlformats.org/officeDocument/2006/relationships" xmlns:p="http://schemas.openxmlformats.org/presentationml/2006/main">
+  <p:cSld>
+    <p:spTree>
+      <p:nvGrpSpPr>
+        <p:cNvPr id="1" name=""/>
+        <p:cNvGrpSpPr/>
+        <p:nvPr/>
+      </p:nvGrpSpPr>
+      <p:grpSpPr>
+        <a:xfrm>
+          <a:off x="0" y="0"/>
+          <a:ext cx="0" cy="0"/>
+          <a:chOff x="0" y="0"/>
+          <a:chExt cx="0" cy="0"/>
+        </a:xfrm>
+      </p:grpSpPr>
+      <p:sp>
+        <p:nvSpPr>
+          <p:cNvPr id="2" name="Text Placeholder 1"/>
+          <p:cNvSpPr>
+            <a:spLocks noGrp="1"/>
+          </p:cNvSpPr>
+          <p:nvPr>
+            <p:ph type="body" sz="quarter" idx="20"/>
+          </p:nvPr>
+        </p:nvSpPr>
+        <p:spPr/>
+        <p:txBody>
+          <a:bodyPr/>
+          <a:lstStyle/>
+          <a:p>
+            <a:r>
+              <a:rPr lang="es-ES" dirty="0"/>
+              <a:t>Project status</a:t>
+            </a:r>
+          </a:p>
+        </p:txBody>
+      </p:sp>
+      <p:sp>
+        <p:nvSpPr>
+          <p:cNvPr id="7" name="TextBox 6"/>
+          <p:cNvSpPr txBox="1"/>
+          <p:nvPr/>
+        </p:nvSpPr>
+        <p:spPr>
+          <a:xfrm>
+            <a:off x="839416" y="2060848"/>
+            <a:ext cx="6984776" cy="1338828"/>
+          </a:xfrm>
+          <a:prstGeom prst="rect">
+            <a:avLst/>
+          </a:prstGeom>
+          <a:noFill/>
+        </p:spPr>
+        <p:txBody>
+          <a:bodyPr wrap="square" rtlCol="0">
+            <a:spAutoFit/>
+          </a:bodyPr>
+          <a:lstStyle/>
+          <a:p>
+            <a:pPr marL="285750" indent="-285750">
+              <a:lnSpc>
+                <a:spcPct val="150000"/>
+              </a:lnSpc>
+              <a:buFont typeface="Wingdings" panose="05000000000000000000" pitchFamily="2" charset="2"/>
+              <a:buChar char="ü"/>
+            </a:pPr>
+            <a:r>
+              <a:rPr lang="de-CH" dirty="0"/>
+              <a:t>Analytical model and parametric study</a:t>
+            </a:r>
+          </a:p>
+          <a:p>
+            <a:pPr marL="285750" indent="-285750">
+              <a:lnSpc>
+                <a:spcPct val="150000"/>
+              </a:lnSpc>
+              <a:buFont typeface="Wingdings" panose="05000000000000000000" pitchFamily="2" charset="2"/>
+              <a:buChar char="ü"/>
+            </a:pPr>
+            <a:r>
+              <a:rPr lang="de-CH" dirty="0"/>
+              <a:t>Python code to build the model on Abaqus, fully parameterized </a:t>
+            </a:r>
+          </a:p>
+          <a:p>
+            <a:pPr marL="285750" indent="-285750">
+              <a:lnSpc>
+                <a:spcPct val="150000"/>
+              </a:lnSpc>
+              <a:buFont typeface="Wingdings" panose="05000000000000000000" pitchFamily="2" charset="2"/>
+              <a:buChar char="ü"/>
+            </a:pPr>
+            <a:r>
+              <a:rPr lang="de-CH" dirty="0"/>
+              <a:t>Nonlinear simulation of the wing box model </a:t>
+            </a:r>
+          </a:p>
+        </p:txBody>
+      </p:sp>
+      <p:sp>
+        <p:nvSpPr>
+          <p:cNvPr id="3" name="TextBox 2"/>
+          <p:cNvSpPr txBox="1"/>
+          <p:nvPr/>
+        </p:nvSpPr>
+        <p:spPr>
+          <a:xfrm>
+            <a:off x="841233" y="1652820"/>
+            <a:ext cx="7848872" cy="369332"/>
+          </a:xfrm>
+          <a:prstGeom prst="rect">
+            <a:avLst/>
+          </a:prstGeom>
+          <a:noFill/>
+        </p:spPr>
+        <p:txBody>
+          <a:bodyPr wrap="square" rtlCol="0">
+            <a:spAutoFit/>
+          </a:bodyPr>
+          <a:lstStyle/>
+          <a:p>
+            <a:r>
+              <a:rPr lang="es-ES" b="1" dirty="0"/>
+              <a:t>Done</a:t>
+            </a:r>
+          </a:p>
+        </p:txBody>
+      </p:sp>
+      <p:sp>
+        <p:nvSpPr>
+          <p:cNvPr id="6" name="TextBox 5"/>
+          <p:cNvSpPr txBox="1"/>
+          <p:nvPr/>
+        </p:nvSpPr>
+        <p:spPr>
+          <a:xfrm>
+            <a:off x="839416" y="4149080"/>
+            <a:ext cx="6984776" cy="923330"/>
+          </a:xfrm>
+          <a:prstGeom prst="rect">
+            <a:avLst/>
+          </a:prstGeom>
+          <a:noFill/>
+        </p:spPr>
+        <p:txBody>
+          <a:bodyPr wrap="square" rtlCol="0">
+            <a:spAutoFit/>
+          </a:bodyPr>
+          <a:lstStyle/>
+          <a:p>
+            <a:pPr marL="285750" indent="-285750">
+              <a:lnSpc>
+                <a:spcPct val="150000"/>
+              </a:lnSpc>
+              <a:buFont typeface="Wingdings" panose="05000000000000000000" pitchFamily="2" charset="2"/>
+              <a:buChar char="q"/>
+            </a:pPr>
+            <a:r>
+              <a:rPr lang="de-CH" dirty="0"/>
+              <a:t>Nonlinear simulations on the full wing model</a:t>
+            </a:r>
+          </a:p>
+          <a:p>
+            <a:pPr marL="285750" indent="-285750">
+              <a:lnSpc>
+                <a:spcPct val="150000"/>
+              </a:lnSpc>
+              <a:buFont typeface="Wingdings" panose="05000000000000000000" pitchFamily="2" charset="2"/>
+              <a:buChar char="q"/>
+            </a:pPr>
+            <a:r>
+              <a:rPr lang="de-CH" dirty="0"/>
+              <a:t>Parametric study</a:t>
+            </a:r>
+          </a:p>
+        </p:txBody>
+      </p:sp>
+      <p:sp>
+        <p:nvSpPr>
+          <p:cNvPr id="8" name="TextBox 7"/>
+          <p:cNvSpPr txBox="1"/>
+          <p:nvPr/>
+        </p:nvSpPr>
+        <p:spPr>
+          <a:xfrm>
+            <a:off x="841233" y="3741052"/>
+            <a:ext cx="7848872" cy="369332"/>
+          </a:xfrm>
+          <a:prstGeom prst="rect">
+            <a:avLst/>
+          </a:prstGeom>
+          <a:noFill/>
+        </p:spPr>
+        <p:txBody>
+          <a:bodyPr wrap="square" rtlCol="0">
+            <a:spAutoFit/>
+          </a:bodyPr>
+          <a:lstStyle/>
+          <a:p>
+            <a:r>
+              <a:rPr lang="es-ES" b="1" dirty="0"/>
+              <a:t>To be </a:t>
+            </a:r>
+            <a:r>
+              <a:rPr lang="es-ES" b="1" dirty="0" err="1"/>
+              <a:t>completed</a:t>
+            </a:r>
+            <a:endParaRPr lang="es-ES" b="1" dirty="0"/>
+          </a:p>
+        </p:txBody>
+      </p:sp>
+    </p:spTree>
+    <p:extLst>
+      <p:ext uri="{BB962C8B-B14F-4D97-AF65-F5344CB8AC3E}">
+        <p14:creationId xmlns:p14="http://schemas.microsoft.com/office/powerpoint/2010/main" val="1853508797"/>
+      </p:ext>
+    </p:extLst>
+  </p:cSld>
+  <p:clrMapOvr>
+    <a:masterClrMapping/>
+  </p:clrMapOvr>
+</p:sld>
+</file>
+
+<file path=ppt/slides/slide12.xml><?xml version="1.0" encoding="utf-8"?>
 <p:sld xmlns:a="http://schemas.openxmlformats.org/drawingml/2006/main" xmlns:r="http://schemas.openxmlformats.org/officeDocument/2006/relationships" xmlns:p="http://schemas.openxmlformats.org/presentationml/2006/main">
   <p:cSld>
     <p:spTree>
@@ -9298,6 +9525,21 @@
 </file>
 
 <file path=customXml/item1.xml><?xml version="1.0" encoding="utf-8"?>
+<?mso-contentType ?>
+<FormTemplates xmlns="http://schemas.microsoft.com/sharepoint/v3/contenttype/forms">
+  <Display>DocumentLibraryForm</Display>
+  <Edit>DocumentLibraryForm</Edit>
+  <New>DocumentLibraryForm</New>
+</FormTemplates>
+</file>
+
+<file path=customXml/item2.xml><?xml version="1.0" encoding="utf-8"?>
+<p:properties xmlns:p="http://schemas.microsoft.com/office/2006/metadata/properties" xmlns:xsi="http://www.w3.org/2001/XMLSchema-instance" xmlns:pc="http://schemas.microsoft.com/office/infopath/2007/PartnerControls">
+  <documentManagement/>
+</p:properties>
+</file>
+
+<file path=customXml/item3.xml><?xml version="1.0" encoding="utf-8"?>
 <ct:contentTypeSchema xmlns:ct="http://schemas.microsoft.com/office/2006/metadata/contentType" xmlns:ma="http://schemas.microsoft.com/office/2006/metadata/properties/metaAttributes" ct:_="" ma:_="" ma:contentTypeName="Document" ma:contentTypeID="0x01010029F9A780F40D6D43967DF6A0E4BBBC14" ma:contentTypeVersion="3" ma:contentTypeDescription="Create a new document." ma:contentTypeScope="" ma:versionID="46084dd6e4eb7f4e55e22b01662baf7b">
   <xsd:schema xmlns:xsd="http://www.w3.org/2001/XMLSchema" xmlns:xs="http://www.w3.org/2001/XMLSchema" xmlns:p="http://schemas.microsoft.com/office/2006/metadata/properties" targetNamespace="http://schemas.microsoft.com/office/2006/metadata/properties" ma:root="true" ma:fieldsID="8022916f55ab85163ee9a5069dec31d5">
     <xsd:element name="properties">
@@ -9411,33 +9653,10 @@
 </ct:contentTypeSchema>
 </file>
 
-<file path=customXml/item2.xml><?xml version="1.0" encoding="utf-8"?>
-<p:properties xmlns:p="http://schemas.microsoft.com/office/2006/metadata/properties" xmlns:xsi="http://www.w3.org/2001/XMLSchema-instance" xmlns:pc="http://schemas.microsoft.com/office/infopath/2007/PartnerControls">
-  <documentManagement/>
-</p:properties>
-</file>
-
-<file path=customXml/item3.xml><?xml version="1.0" encoding="utf-8"?>
-<?mso-contentType ?>
-<FormTemplates xmlns="http://schemas.microsoft.com/sharepoint/v3/contenttype/forms">
-  <Display>DocumentLibraryForm</Display>
-  <Edit>DocumentLibraryForm</Edit>
-  <New>DocumentLibraryForm</New>
-</FormTemplates>
-</file>
-
 <file path=customXml/itemProps1.xml><?xml version="1.0" encoding="utf-8"?>
-<ds:datastoreItem xmlns:ds="http://schemas.openxmlformats.org/officeDocument/2006/customXml" ds:itemID="{7DD48CA2-582A-4403-B04A-9D1525385275}">
+<ds:datastoreItem xmlns:ds="http://schemas.openxmlformats.org/officeDocument/2006/customXml" ds:itemID="{8F2FDF69-5A1A-4E32-A5EE-49837B61342A}">
   <ds:schemaRefs>
-    <ds:schemaRef ds:uri="http://schemas.microsoft.com/office/2006/metadata/contentType"/>
-    <ds:schemaRef ds:uri="http://schemas.microsoft.com/office/2006/metadata/properties/metaAttributes"/>
-    <ds:schemaRef ds:uri="http://www.w3.org/2001/XMLSchema"/>
-    <ds:schemaRef ds:uri="http://schemas.microsoft.com/office/2006/metadata/properties"/>
-    <ds:schemaRef ds:uri="http://schemas.openxmlformats.org/package/2006/metadata/core-properties"/>
-    <ds:schemaRef ds:uri="http://purl.org/dc/elements/1.1/"/>
-    <ds:schemaRef ds:uri="http://purl.org/dc/terms/"/>
-    <ds:schemaRef ds:uri="http://schemas.microsoft.com/internal/obd"/>
-    <ds:schemaRef ds:uri="http://schemas.microsoft.com/office/infopath/2007/PartnerControls"/>
+    <ds:schemaRef ds:uri="http://schemas.microsoft.com/sharepoint/v3/contenttype/forms"/>
   </ds:schemaRefs>
 </ds:datastoreItem>
 </file>
@@ -9458,9 +9677,17 @@
 </file>
 
 <file path=customXml/itemProps3.xml><?xml version="1.0" encoding="utf-8"?>
-<ds:datastoreItem xmlns:ds="http://schemas.openxmlformats.org/officeDocument/2006/customXml" ds:itemID="{8F2FDF69-5A1A-4E32-A5EE-49837B61342A}">
+<ds:datastoreItem xmlns:ds="http://schemas.openxmlformats.org/officeDocument/2006/customXml" ds:itemID="{7DD48CA2-582A-4403-B04A-9D1525385275}">
   <ds:schemaRefs>
-    <ds:schemaRef ds:uri="http://schemas.microsoft.com/sharepoint/v3/contenttype/forms"/>
+    <ds:schemaRef ds:uri="http://schemas.microsoft.com/office/2006/metadata/contentType"/>
+    <ds:schemaRef ds:uri="http://schemas.microsoft.com/office/2006/metadata/properties/metaAttributes"/>
+    <ds:schemaRef ds:uri="http://www.w3.org/2001/XMLSchema"/>
+    <ds:schemaRef ds:uri="http://schemas.microsoft.com/office/2006/metadata/properties"/>
+    <ds:schemaRef ds:uri="http://schemas.openxmlformats.org/package/2006/metadata/core-properties"/>
+    <ds:schemaRef ds:uri="http://purl.org/dc/elements/1.1/"/>
+    <ds:schemaRef ds:uri="http://purl.org/dc/terms/"/>
+    <ds:schemaRef ds:uri="http://schemas.microsoft.com/internal/obd"/>
+    <ds:schemaRef ds:uri="http://schemas.microsoft.com/office/infopath/2007/PartnerControls"/>
   </ds:schemaRefs>
 </ds:datastoreItem>
 </file>
</xml_diff>

<commit_message>
Slide showing the presentation overview
</commit_message>
<xml_diff>
--- a/Presentation_OstfaliaUni.pptx
+++ b/Presentation_OstfaliaUni.pptx
@@ -6,24 +6,25 @@
     <p:sldMasterId id="2147483745" r:id="rId5"/>
   </p:sldMasterIdLst>
   <p:notesMasterIdLst>
-    <p:notesMasterId r:id="rId18"/>
+    <p:notesMasterId r:id="rId19"/>
   </p:notesMasterIdLst>
   <p:handoutMasterIdLst>
-    <p:handoutMasterId r:id="rId19"/>
+    <p:handoutMasterId r:id="rId20"/>
   </p:handoutMasterIdLst>
   <p:sldIdLst>
     <p:sldId id="256" r:id="rId6"/>
     <p:sldId id="258" r:id="rId7"/>
-    <p:sldId id="259" r:id="rId8"/>
-    <p:sldId id="261" r:id="rId9"/>
-    <p:sldId id="263" r:id="rId10"/>
-    <p:sldId id="262" r:id="rId11"/>
-    <p:sldId id="264" r:id="rId12"/>
-    <p:sldId id="266" r:id="rId13"/>
-    <p:sldId id="268" r:id="rId14"/>
-    <p:sldId id="267" r:id="rId15"/>
-    <p:sldId id="269" r:id="rId16"/>
-    <p:sldId id="260" r:id="rId17"/>
+    <p:sldId id="270" r:id="rId8"/>
+    <p:sldId id="259" r:id="rId9"/>
+    <p:sldId id="261" r:id="rId10"/>
+    <p:sldId id="263" r:id="rId11"/>
+    <p:sldId id="262" r:id="rId12"/>
+    <p:sldId id="264" r:id="rId13"/>
+    <p:sldId id="266" r:id="rId14"/>
+    <p:sldId id="268" r:id="rId15"/>
+    <p:sldId id="267" r:id="rId16"/>
+    <p:sldId id="269" r:id="rId17"/>
+    <p:sldId id="260" r:id="rId18"/>
   </p:sldIdLst>
   <p:sldSz cx="12192000" cy="6858000"/>
   <p:notesSz cx="6797675" cy="9928225"/>
@@ -851,7 +852,7 @@
           <a:p>
             <a:fld id="{3B11FC8D-FEAC-3A4D-B17B-284E661AD230}" type="slidenum">
               <a:rPr lang="en-US" smtClean="0"/>
-              <a:t>3</a:t>
+              <a:t>4</a:t>
             </a:fld>
             <a:endParaRPr lang="en-US"/>
           </a:p>
@@ -5832,7 +5833,15 @@
           <a:p>
             <a:r>
               <a:rPr lang="es-ES" dirty="0" err="1"/>
-              <a:t>Whole</a:t>
+              <a:t>Wing</a:t>
+            </a:r>
+            <a:r>
+              <a:rPr lang="es-ES" dirty="0"/>
+              <a:t> box </a:t>
+            </a:r>
+            <a:r>
+              <a:rPr lang="es-ES" dirty="0" err="1"/>
+              <a:t>nonlinear</a:t>
             </a:r>
             <a:r>
               <a:rPr lang="es-ES" dirty="0"/>
@@ -5840,7 +5849,7 @@
             </a:r>
             <a:r>
               <a:rPr lang="es-ES" dirty="0" err="1"/>
-              <a:t>wing</a:t>
+              <a:t>simulations</a:t>
             </a:r>
             <a:r>
               <a:rPr lang="es-ES" dirty="0"/>
@@ -5848,7 +5857,7 @@
             </a:r>
             <a:r>
               <a:rPr lang="es-ES" dirty="0" err="1"/>
-              <a:t>model</a:t>
+              <a:t>results</a:t>
             </a:r>
             <a:endParaRPr lang="es-ES" dirty="0"/>
           </a:p>
@@ -5862,8 +5871,8 @@
         </p:nvSpPr>
         <p:spPr>
           <a:xfrm>
-            <a:off x="695400" y="1412777"/>
-            <a:ext cx="6984776" cy="1703030"/>
+            <a:off x="695400" y="1412776"/>
+            <a:ext cx="6192688" cy="369332"/>
           </a:xfrm>
           <a:prstGeom prst="rect">
             <a:avLst/>
@@ -5876,42 +5885,9 @@
           </a:bodyPr>
           <a:lstStyle/>
           <a:p>
-            <a:pPr marL="285750" indent="-285750">
-              <a:lnSpc>
-                <a:spcPct val="150000"/>
-              </a:lnSpc>
-              <a:buFont typeface="Arial" panose="020B0604020202020204" pitchFamily="34" charset="0"/>
-              <a:buChar char="•"/>
-            </a:pPr>
             <a:r>
               <a:rPr lang="de-CH" dirty="0"/>
-              <a:t>Embeded wing box with chiral structure in one of the web</a:t>
-            </a:r>
-          </a:p>
-          <a:p>
-            <a:pPr marL="285750" indent="-285750">
-              <a:lnSpc>
-                <a:spcPct val="150000"/>
-              </a:lnSpc>
-              <a:buFont typeface="Arial" panose="020B0604020202020204" pitchFamily="34" charset="0"/>
-              <a:buChar char="•"/>
-            </a:pPr>
-            <a:r>
-              <a:rPr lang="de-CH" dirty="0"/>
-              <a:t>Aerodynamic loads calculated using XFOIL and lift line evalution</a:t>
-            </a:r>
-          </a:p>
-          <a:p>
-            <a:pPr marL="285750" indent="-285750">
-              <a:lnSpc>
-                <a:spcPct val="150000"/>
-              </a:lnSpc>
-              <a:buFont typeface="Arial" panose="020B0604020202020204" pitchFamily="34" charset="0"/>
-              <a:buChar char="•"/>
-            </a:pPr>
-            <a:r>
-              <a:rPr lang="de-CH" dirty="0"/>
-              <a:t>FEM + XFOIL interection within a loop until convergence is achieved</a:t>
+              <a:t>Beam twist evolution with the fraction of load applied</a:t>
             </a:r>
             <a:endParaRPr lang="en-US" dirty="0"/>
           </a:p>
@@ -5939,8 +5915,8 @@
         </p:blipFill>
         <p:spPr>
           <a:xfrm>
-            <a:off x="2207568" y="3284984"/>
-            <a:ext cx="7776864" cy="2722947"/>
+            <a:off x="2351584" y="1761561"/>
+            <a:ext cx="7513971" cy="4581828"/>
           </a:xfrm>
           <a:prstGeom prst="rect">
             <a:avLst/>
@@ -5950,7 +5926,7 @@
     </p:spTree>
     <p:extLst>
       <p:ext uri="{BB962C8B-B14F-4D97-AF65-F5344CB8AC3E}">
-        <p14:creationId xmlns:p14="http://schemas.microsoft.com/office/powerpoint/2010/main" val="2176087766"/>
+        <p14:creationId xmlns:p14="http://schemas.microsoft.com/office/powerpoint/2010/main" val="3265074744"/>
       </p:ext>
     </p:extLst>
   </p:cSld>
@@ -5993,9 +5969,26 @@
           <a:lstStyle/>
           <a:p>
             <a:r>
+              <a:rPr lang="es-ES" dirty="0" err="1"/>
+              <a:t>Whole</a:t>
+            </a:r>
+            <a:r>
               <a:rPr lang="es-ES" dirty="0"/>
-              <a:t>Project status</a:t>
-            </a:r>
+              <a:t> </a:t>
+            </a:r>
+            <a:r>
+              <a:rPr lang="es-ES" dirty="0" err="1"/>
+              <a:t>wing</a:t>
+            </a:r>
+            <a:r>
+              <a:rPr lang="es-ES" dirty="0"/>
+              <a:t> </a:t>
+            </a:r>
+            <a:r>
+              <a:rPr lang="es-ES" dirty="0" err="1"/>
+              <a:t>model</a:t>
+            </a:r>
+            <a:endParaRPr lang="es-ES" dirty="0"/>
           </a:p>
         </p:txBody>
       </p:sp>
@@ -6007,8 +6000,8 @@
         </p:nvSpPr>
         <p:spPr>
           <a:xfrm>
-            <a:off x="839416" y="2060848"/>
-            <a:ext cx="6984776" cy="1338828"/>
+            <a:off x="695400" y="1412777"/>
+            <a:ext cx="6984776" cy="1703030"/>
           </a:xfrm>
           <a:prstGeom prst="rect">
             <a:avLst/>
@@ -6025,12 +6018,12 @@
               <a:lnSpc>
                 <a:spcPct val="150000"/>
               </a:lnSpc>
-              <a:buFont typeface="Wingdings" panose="05000000000000000000" pitchFamily="2" charset="2"/>
-              <a:buChar char="ü"/>
+              <a:buFont typeface="Arial" panose="020B0604020202020204" pitchFamily="34" charset="0"/>
+              <a:buChar char="•"/>
             </a:pPr>
             <a:r>
               <a:rPr lang="de-CH" dirty="0"/>
-              <a:t>Analytical model and parametric study</a:t>
+              <a:t>Embeded wing box with chiral structure in one of the web</a:t>
             </a:r>
           </a:p>
           <a:p>
@@ -6038,12 +6031,12 @@
               <a:lnSpc>
                 <a:spcPct val="150000"/>
               </a:lnSpc>
-              <a:buFont typeface="Wingdings" panose="05000000000000000000" pitchFamily="2" charset="2"/>
-              <a:buChar char="ü"/>
+              <a:buFont typeface="Arial" panose="020B0604020202020204" pitchFamily="34" charset="0"/>
+              <a:buChar char="•"/>
             </a:pPr>
             <a:r>
               <a:rPr lang="de-CH" dirty="0"/>
-              <a:t>Python code to build the model on Abaqus, fully parameterized </a:t>
+              <a:t>Aerodynamic loads calculated using XFOIL and lift line evalution</a:t>
             </a:r>
           </a:p>
           <a:p>
@@ -6051,132 +6044,51 @@
               <a:lnSpc>
                 <a:spcPct val="150000"/>
               </a:lnSpc>
-              <a:buFont typeface="Wingdings" panose="05000000000000000000" pitchFamily="2" charset="2"/>
-              <a:buChar char="ü"/>
+              <a:buFont typeface="Arial" panose="020B0604020202020204" pitchFamily="34" charset="0"/>
+              <a:buChar char="•"/>
             </a:pPr>
             <a:r>
               <a:rPr lang="de-CH" dirty="0"/>
-              <a:t>Nonlinear simulation of the wing box model </a:t>
-            </a:r>
-          </a:p>
-        </p:txBody>
-      </p:sp>
-      <p:sp>
-        <p:nvSpPr>
-          <p:cNvPr id="3" name="TextBox 2"/>
-          <p:cNvSpPr txBox="1"/>
+              <a:t>FEM + XFOIL interection within a loop until convergence is achieved</a:t>
+            </a:r>
+            <a:endParaRPr lang="en-US" dirty="0"/>
+          </a:p>
+        </p:txBody>
+      </p:sp>
+      <p:pic>
+        <p:nvPicPr>
+          <p:cNvPr id="4" name="Picture 3"/>
+          <p:cNvPicPr>
+            <a:picLocks noChangeAspect="1"/>
+          </p:cNvPicPr>
           <p:nvPr/>
-        </p:nvSpPr>
-        <p:spPr>
-          <a:xfrm>
-            <a:off x="841233" y="1652820"/>
-            <a:ext cx="7848872" cy="369332"/>
-          </a:xfrm>
-          <a:prstGeom prst="rect">
-            <a:avLst/>
-          </a:prstGeom>
-          <a:noFill/>
-        </p:spPr>
-        <p:txBody>
-          <a:bodyPr wrap="square" rtlCol="0">
-            <a:spAutoFit/>
-          </a:bodyPr>
-          <a:lstStyle/>
-          <a:p>
-            <a:r>
-              <a:rPr lang="es-ES" b="1" dirty="0"/>
-              <a:t>Done</a:t>
-            </a:r>
-          </a:p>
-        </p:txBody>
-      </p:sp>
-      <p:sp>
-        <p:nvSpPr>
-          <p:cNvPr id="6" name="TextBox 5"/>
-          <p:cNvSpPr txBox="1"/>
-          <p:nvPr/>
-        </p:nvSpPr>
-        <p:spPr>
-          <a:xfrm>
-            <a:off x="839416" y="4149080"/>
-            <a:ext cx="6984776" cy="923330"/>
-          </a:xfrm>
-          <a:prstGeom prst="rect">
-            <a:avLst/>
-          </a:prstGeom>
-          <a:noFill/>
-        </p:spPr>
-        <p:txBody>
-          <a:bodyPr wrap="square" rtlCol="0">
-            <a:spAutoFit/>
-          </a:bodyPr>
-          <a:lstStyle/>
-          <a:p>
-            <a:pPr marL="285750" indent="-285750">
-              <a:lnSpc>
-                <a:spcPct val="150000"/>
-              </a:lnSpc>
-              <a:buFont typeface="Wingdings" panose="05000000000000000000" pitchFamily="2" charset="2"/>
-              <a:buChar char="q"/>
-            </a:pPr>
-            <a:r>
-              <a:rPr lang="de-CH" dirty="0"/>
-              <a:t>Nonlinear simulations on the full wing model</a:t>
-            </a:r>
-          </a:p>
-          <a:p>
-            <a:pPr marL="285750" indent="-285750">
-              <a:lnSpc>
-                <a:spcPct val="150000"/>
-              </a:lnSpc>
-              <a:buFont typeface="Wingdings" panose="05000000000000000000" pitchFamily="2" charset="2"/>
-              <a:buChar char="q"/>
-            </a:pPr>
-            <a:r>
-              <a:rPr lang="de-CH" dirty="0"/>
-              <a:t>Parametric study</a:t>
-            </a:r>
-          </a:p>
-        </p:txBody>
-      </p:sp>
-      <p:sp>
-        <p:nvSpPr>
-          <p:cNvPr id="8" name="TextBox 7"/>
-          <p:cNvSpPr txBox="1"/>
-          <p:nvPr/>
-        </p:nvSpPr>
-        <p:spPr>
-          <a:xfrm>
-            <a:off x="841233" y="3741052"/>
-            <a:ext cx="7848872" cy="369332"/>
-          </a:xfrm>
-          <a:prstGeom prst="rect">
-            <a:avLst/>
-          </a:prstGeom>
-          <a:noFill/>
-        </p:spPr>
-        <p:txBody>
-          <a:bodyPr wrap="square" rtlCol="0">
-            <a:spAutoFit/>
-          </a:bodyPr>
-          <a:lstStyle/>
-          <a:p>
-            <a:r>
-              <a:rPr lang="es-ES" b="1" dirty="0"/>
-              <a:t>To be </a:t>
-            </a:r>
-            <a:r>
-              <a:rPr lang="es-ES" b="1" dirty="0" err="1"/>
-              <a:t>completed</a:t>
-            </a:r>
-            <a:endParaRPr lang="es-ES" b="1" dirty="0"/>
-          </a:p>
-        </p:txBody>
-      </p:sp>
+        </p:nvPicPr>
+        <p:blipFill>
+          <a:blip r:embed="rId2">
+            <a:extLst>
+              <a:ext uri="{28A0092B-C50C-407E-A947-70E740481C1C}">
+                <a14:useLocalDpi xmlns:a14="http://schemas.microsoft.com/office/drawing/2010/main" val="0"/>
+              </a:ext>
+            </a:extLst>
+          </a:blip>
+          <a:stretch>
+            <a:fillRect/>
+          </a:stretch>
+        </p:blipFill>
+        <p:spPr>
+          <a:xfrm>
+            <a:off x="2207568" y="3284984"/>
+            <a:ext cx="7776864" cy="2722947"/>
+          </a:xfrm>
+          <a:prstGeom prst="rect">
+            <a:avLst/>
+          </a:prstGeom>
+        </p:spPr>
+      </p:pic>
     </p:spTree>
     <p:extLst>
       <p:ext uri="{BB962C8B-B14F-4D97-AF65-F5344CB8AC3E}">
-        <p14:creationId xmlns:p14="http://schemas.microsoft.com/office/powerpoint/2010/main" val="1853508797"/>
+        <p14:creationId xmlns:p14="http://schemas.microsoft.com/office/powerpoint/2010/main" val="2176087766"/>
       </p:ext>
     </p:extLst>
   </p:cSld>
@@ -6210,6 +6122,232 @@
             <a:spLocks noGrp="1"/>
           </p:cNvSpPr>
           <p:nvPr>
+            <p:ph type="body" sz="quarter" idx="20"/>
+          </p:nvPr>
+        </p:nvSpPr>
+        <p:spPr/>
+        <p:txBody>
+          <a:bodyPr/>
+          <a:lstStyle/>
+          <a:p>
+            <a:r>
+              <a:rPr lang="es-ES" dirty="0"/>
+              <a:t>Project status</a:t>
+            </a:r>
+          </a:p>
+        </p:txBody>
+      </p:sp>
+      <p:sp>
+        <p:nvSpPr>
+          <p:cNvPr id="7" name="TextBox 6"/>
+          <p:cNvSpPr txBox="1"/>
+          <p:nvPr/>
+        </p:nvSpPr>
+        <p:spPr>
+          <a:xfrm>
+            <a:off x="839416" y="2060848"/>
+            <a:ext cx="6984776" cy="1338828"/>
+          </a:xfrm>
+          <a:prstGeom prst="rect">
+            <a:avLst/>
+          </a:prstGeom>
+          <a:noFill/>
+        </p:spPr>
+        <p:txBody>
+          <a:bodyPr wrap="square" rtlCol="0">
+            <a:spAutoFit/>
+          </a:bodyPr>
+          <a:lstStyle/>
+          <a:p>
+            <a:pPr marL="285750" indent="-285750">
+              <a:lnSpc>
+                <a:spcPct val="150000"/>
+              </a:lnSpc>
+              <a:buFont typeface="Wingdings" panose="05000000000000000000" pitchFamily="2" charset="2"/>
+              <a:buChar char="ü"/>
+            </a:pPr>
+            <a:r>
+              <a:rPr lang="de-CH" dirty="0"/>
+              <a:t>Analytical model and parametric study</a:t>
+            </a:r>
+          </a:p>
+          <a:p>
+            <a:pPr marL="285750" indent="-285750">
+              <a:lnSpc>
+                <a:spcPct val="150000"/>
+              </a:lnSpc>
+              <a:buFont typeface="Wingdings" panose="05000000000000000000" pitchFamily="2" charset="2"/>
+              <a:buChar char="ü"/>
+            </a:pPr>
+            <a:r>
+              <a:rPr lang="de-CH" dirty="0"/>
+              <a:t>Python code to build the model on Abaqus, fully parameterized </a:t>
+            </a:r>
+          </a:p>
+          <a:p>
+            <a:pPr marL="285750" indent="-285750">
+              <a:lnSpc>
+                <a:spcPct val="150000"/>
+              </a:lnSpc>
+              <a:buFont typeface="Wingdings" panose="05000000000000000000" pitchFamily="2" charset="2"/>
+              <a:buChar char="ü"/>
+            </a:pPr>
+            <a:r>
+              <a:rPr lang="de-CH" dirty="0"/>
+              <a:t>Nonlinear simulation of the wing box model </a:t>
+            </a:r>
+          </a:p>
+        </p:txBody>
+      </p:sp>
+      <p:sp>
+        <p:nvSpPr>
+          <p:cNvPr id="3" name="TextBox 2"/>
+          <p:cNvSpPr txBox="1"/>
+          <p:nvPr/>
+        </p:nvSpPr>
+        <p:spPr>
+          <a:xfrm>
+            <a:off x="841233" y="1652820"/>
+            <a:ext cx="7848872" cy="369332"/>
+          </a:xfrm>
+          <a:prstGeom prst="rect">
+            <a:avLst/>
+          </a:prstGeom>
+          <a:noFill/>
+        </p:spPr>
+        <p:txBody>
+          <a:bodyPr wrap="square" rtlCol="0">
+            <a:spAutoFit/>
+          </a:bodyPr>
+          <a:lstStyle/>
+          <a:p>
+            <a:r>
+              <a:rPr lang="es-ES" b="1" dirty="0"/>
+              <a:t>Done</a:t>
+            </a:r>
+          </a:p>
+        </p:txBody>
+      </p:sp>
+      <p:sp>
+        <p:nvSpPr>
+          <p:cNvPr id="6" name="TextBox 5"/>
+          <p:cNvSpPr txBox="1"/>
+          <p:nvPr/>
+        </p:nvSpPr>
+        <p:spPr>
+          <a:xfrm>
+            <a:off x="839416" y="4149080"/>
+            <a:ext cx="6984776" cy="923330"/>
+          </a:xfrm>
+          <a:prstGeom prst="rect">
+            <a:avLst/>
+          </a:prstGeom>
+          <a:noFill/>
+        </p:spPr>
+        <p:txBody>
+          <a:bodyPr wrap="square" rtlCol="0">
+            <a:spAutoFit/>
+          </a:bodyPr>
+          <a:lstStyle/>
+          <a:p>
+            <a:pPr marL="285750" indent="-285750">
+              <a:lnSpc>
+                <a:spcPct val="150000"/>
+              </a:lnSpc>
+              <a:buFont typeface="Wingdings" panose="05000000000000000000" pitchFamily="2" charset="2"/>
+              <a:buChar char="q"/>
+            </a:pPr>
+            <a:r>
+              <a:rPr lang="de-CH" dirty="0"/>
+              <a:t>Nonlinear simulations on the full wing model</a:t>
+            </a:r>
+          </a:p>
+          <a:p>
+            <a:pPr marL="285750" indent="-285750">
+              <a:lnSpc>
+                <a:spcPct val="150000"/>
+              </a:lnSpc>
+              <a:buFont typeface="Wingdings" panose="05000000000000000000" pitchFamily="2" charset="2"/>
+              <a:buChar char="q"/>
+            </a:pPr>
+            <a:r>
+              <a:rPr lang="de-CH" dirty="0"/>
+              <a:t>Parametric study</a:t>
+            </a:r>
+          </a:p>
+        </p:txBody>
+      </p:sp>
+      <p:sp>
+        <p:nvSpPr>
+          <p:cNvPr id="8" name="TextBox 7"/>
+          <p:cNvSpPr txBox="1"/>
+          <p:nvPr/>
+        </p:nvSpPr>
+        <p:spPr>
+          <a:xfrm>
+            <a:off x="841233" y="3741052"/>
+            <a:ext cx="7848872" cy="369332"/>
+          </a:xfrm>
+          <a:prstGeom prst="rect">
+            <a:avLst/>
+          </a:prstGeom>
+          <a:noFill/>
+        </p:spPr>
+        <p:txBody>
+          <a:bodyPr wrap="square" rtlCol="0">
+            <a:spAutoFit/>
+          </a:bodyPr>
+          <a:lstStyle/>
+          <a:p>
+            <a:r>
+              <a:rPr lang="es-ES" b="1" dirty="0"/>
+              <a:t>To be </a:t>
+            </a:r>
+            <a:r>
+              <a:rPr lang="es-ES" b="1" dirty="0" err="1"/>
+              <a:t>completed</a:t>
+            </a:r>
+            <a:endParaRPr lang="es-ES" b="1" dirty="0"/>
+          </a:p>
+        </p:txBody>
+      </p:sp>
+    </p:spTree>
+    <p:extLst>
+      <p:ext uri="{BB962C8B-B14F-4D97-AF65-F5344CB8AC3E}">
+        <p14:creationId xmlns:p14="http://schemas.microsoft.com/office/powerpoint/2010/main" val="1853508797"/>
+      </p:ext>
+    </p:extLst>
+  </p:cSld>
+  <p:clrMapOvr>
+    <a:masterClrMapping/>
+  </p:clrMapOvr>
+</p:sld>
+</file>
+
+<file path=ppt/slides/slide13.xml><?xml version="1.0" encoding="utf-8"?>
+<p:sld xmlns:a="http://schemas.openxmlformats.org/drawingml/2006/main" xmlns:r="http://schemas.openxmlformats.org/officeDocument/2006/relationships" xmlns:p="http://schemas.openxmlformats.org/presentationml/2006/main">
+  <p:cSld>
+    <p:spTree>
+      <p:nvGrpSpPr>
+        <p:cNvPr id="1" name=""/>
+        <p:cNvGrpSpPr/>
+        <p:nvPr/>
+      </p:nvGrpSpPr>
+      <p:grpSpPr>
+        <a:xfrm>
+          <a:off x="0" y="0"/>
+          <a:ext cx="0" cy="0"/>
+          <a:chOff x="0" y="0"/>
+          <a:chExt cx="0" cy="0"/>
+        </a:xfrm>
+      </p:grpSpPr>
+      <p:sp>
+        <p:nvSpPr>
+          <p:cNvPr id="2" name="Text Placeholder 1"/>
+          <p:cNvSpPr>
+            <a:spLocks noGrp="1"/>
+          </p:cNvSpPr>
+          <p:nvPr>
             <p:ph type="body" sz="quarter" idx="17"/>
           </p:nvPr>
         </p:nvSpPr>
@@ -6394,6 +6532,250 @@
 </file>
 
 <file path=ppt/slides/slide2.xml><?xml version="1.0" encoding="utf-8"?>
+<p:sld xmlns:a="http://schemas.openxmlformats.org/drawingml/2006/main" xmlns:r="http://schemas.openxmlformats.org/officeDocument/2006/relationships" xmlns:p="http://schemas.openxmlformats.org/presentationml/2006/main">
+  <p:cSld>
+    <p:spTree>
+      <p:nvGrpSpPr>
+        <p:cNvPr id="1" name=""/>
+        <p:cNvGrpSpPr/>
+        <p:nvPr/>
+      </p:nvGrpSpPr>
+      <p:grpSpPr>
+        <a:xfrm>
+          <a:off x="0" y="0"/>
+          <a:ext cx="0" cy="0"/>
+          <a:chOff x="0" y="0"/>
+          <a:chExt cx="0" cy="0"/>
+        </a:xfrm>
+      </p:grpSpPr>
+      <p:sp>
+        <p:nvSpPr>
+          <p:cNvPr id="2" name="Text Placeholder 1"/>
+          <p:cNvSpPr>
+            <a:spLocks noGrp="1"/>
+          </p:cNvSpPr>
+          <p:nvPr>
+            <p:ph type="body" sz="quarter" idx="20"/>
+          </p:nvPr>
+        </p:nvSpPr>
+        <p:spPr/>
+        <p:txBody>
+          <a:bodyPr/>
+          <a:lstStyle/>
+          <a:p>
+            <a:r>
+              <a:rPr lang="es-ES" dirty="0" err="1"/>
+              <a:t>Overview</a:t>
+            </a:r>
+            <a:endParaRPr lang="es-ES" dirty="0"/>
+          </a:p>
+        </p:txBody>
+      </p:sp>
+      <p:sp>
+        <p:nvSpPr>
+          <p:cNvPr id="3" name="TextBox 2"/>
+          <p:cNvSpPr txBox="1"/>
+          <p:nvPr/>
+        </p:nvSpPr>
+        <p:spPr>
+          <a:xfrm>
+            <a:off x="1199456" y="1772816"/>
+            <a:ext cx="9793088" cy="3139321"/>
+          </a:xfrm>
+          <a:prstGeom prst="rect">
+            <a:avLst/>
+          </a:prstGeom>
+          <a:noFill/>
+        </p:spPr>
+        <p:txBody>
+          <a:bodyPr wrap="square" rtlCol="0">
+            <a:spAutoFit/>
+          </a:bodyPr>
+          <a:lstStyle/>
+          <a:p>
+            <a:pPr marL="285750" indent="-285750">
+              <a:buFont typeface="Arial" panose="020B0604020202020204" pitchFamily="34" charset="0"/>
+              <a:buChar char="•"/>
+            </a:pPr>
+            <a:r>
+              <a:rPr lang="es-ES" dirty="0" err="1"/>
+              <a:t>Working</a:t>
+            </a:r>
+            <a:r>
+              <a:rPr lang="es-ES" dirty="0"/>
+              <a:t> </a:t>
+            </a:r>
+            <a:r>
+              <a:rPr lang="es-ES" dirty="0" err="1"/>
+              <a:t>principle</a:t>
+            </a:r>
+            <a:endParaRPr lang="es-ES" dirty="0"/>
+          </a:p>
+          <a:p>
+            <a:pPr marL="285750" indent="-285750">
+              <a:buFont typeface="Arial" panose="020B0604020202020204" pitchFamily="34" charset="0"/>
+              <a:buChar char="•"/>
+            </a:pPr>
+            <a:endParaRPr lang="es-ES" dirty="0"/>
+          </a:p>
+          <a:p>
+            <a:pPr marL="285750" indent="-285750">
+              <a:buFont typeface="Arial" panose="020B0604020202020204" pitchFamily="34" charset="0"/>
+              <a:buChar char="•"/>
+            </a:pPr>
+            <a:r>
+              <a:rPr lang="es-ES" dirty="0" err="1"/>
+              <a:t>Analytical</a:t>
+            </a:r>
+            <a:r>
+              <a:rPr lang="es-ES" dirty="0"/>
+              <a:t> </a:t>
+            </a:r>
+            <a:r>
+              <a:rPr lang="es-ES" dirty="0" err="1"/>
+              <a:t>model</a:t>
+            </a:r>
+            <a:endParaRPr lang="es-ES" dirty="0"/>
+          </a:p>
+          <a:p>
+            <a:pPr marL="285750" indent="-285750">
+              <a:buFont typeface="Arial" panose="020B0604020202020204" pitchFamily="34" charset="0"/>
+              <a:buChar char="•"/>
+            </a:pPr>
+            <a:endParaRPr lang="es-ES" dirty="0"/>
+          </a:p>
+          <a:p>
+            <a:pPr marL="285750" indent="-285750">
+              <a:buFont typeface="Arial" panose="020B0604020202020204" pitchFamily="34" charset="0"/>
+              <a:buChar char="•"/>
+            </a:pPr>
+            <a:r>
+              <a:rPr lang="es-ES" dirty="0" err="1"/>
+              <a:t>Wing</a:t>
+            </a:r>
+            <a:r>
+              <a:rPr lang="es-ES" dirty="0"/>
+              <a:t> box FEM </a:t>
+            </a:r>
+            <a:r>
+              <a:rPr lang="es-ES" dirty="0" err="1"/>
+              <a:t>model</a:t>
+            </a:r>
+            <a:endParaRPr lang="es-ES" dirty="0"/>
+          </a:p>
+          <a:p>
+            <a:pPr marL="285750" indent="-285750">
+              <a:buFont typeface="Arial" panose="020B0604020202020204" pitchFamily="34" charset="0"/>
+              <a:buChar char="•"/>
+            </a:pPr>
+            <a:endParaRPr lang="es-ES" dirty="0"/>
+          </a:p>
+          <a:p>
+            <a:pPr marL="285750" indent="-285750">
+              <a:buFont typeface="Arial" panose="020B0604020202020204" pitchFamily="34" charset="0"/>
+              <a:buChar char="•"/>
+            </a:pPr>
+            <a:r>
+              <a:rPr lang="es-ES" dirty="0"/>
+              <a:t>Full </a:t>
+            </a:r>
+            <a:r>
+              <a:rPr lang="es-ES" dirty="0" err="1"/>
+              <a:t>wing</a:t>
+            </a:r>
+            <a:r>
+              <a:rPr lang="es-ES" dirty="0"/>
+              <a:t> FEM </a:t>
+            </a:r>
+            <a:r>
+              <a:rPr lang="es-ES" dirty="0" err="1"/>
+              <a:t>model</a:t>
+            </a:r>
+            <a:endParaRPr lang="es-ES" dirty="0"/>
+          </a:p>
+          <a:p>
+            <a:pPr marL="285750" indent="-285750">
+              <a:buFont typeface="Arial" panose="020B0604020202020204" pitchFamily="34" charset="0"/>
+              <a:buChar char="•"/>
+            </a:pPr>
+            <a:endParaRPr lang="es-ES" dirty="0"/>
+          </a:p>
+          <a:p>
+            <a:pPr marL="285750" indent="-285750">
+              <a:buFont typeface="Arial" panose="020B0604020202020204" pitchFamily="34" charset="0"/>
+              <a:buChar char="•"/>
+            </a:pPr>
+            <a:r>
+              <a:rPr lang="es-ES" dirty="0" err="1"/>
+              <a:t>Results</a:t>
+            </a:r>
+            <a:r>
+              <a:rPr lang="es-ES" dirty="0"/>
+              <a:t> </a:t>
+            </a:r>
+            <a:r>
+              <a:rPr lang="es-ES" dirty="0" err="1"/>
+              <a:t>from</a:t>
+            </a:r>
+            <a:r>
+              <a:rPr lang="es-ES" dirty="0"/>
+              <a:t> </a:t>
+            </a:r>
+            <a:r>
+              <a:rPr lang="es-ES" dirty="0" err="1"/>
+              <a:t>the</a:t>
+            </a:r>
+            <a:r>
+              <a:rPr lang="es-ES" dirty="0"/>
+              <a:t> </a:t>
+            </a:r>
+            <a:r>
+              <a:rPr lang="es-ES" dirty="0" err="1"/>
+              <a:t>nonlinear</a:t>
+            </a:r>
+            <a:r>
+              <a:rPr lang="es-ES" dirty="0"/>
+              <a:t> </a:t>
+            </a:r>
+            <a:r>
+              <a:rPr lang="es-ES" dirty="0" err="1"/>
+              <a:t>simulations</a:t>
+            </a:r>
+            <a:endParaRPr lang="es-ES" dirty="0"/>
+          </a:p>
+          <a:p>
+            <a:pPr marL="285750" indent="-285750">
+              <a:buFont typeface="Arial" panose="020B0604020202020204" pitchFamily="34" charset="0"/>
+              <a:buChar char="•"/>
+            </a:pPr>
+            <a:endParaRPr lang="es-ES" dirty="0"/>
+          </a:p>
+          <a:p>
+            <a:pPr marL="285750" indent="-285750">
+              <a:buFont typeface="Arial" panose="020B0604020202020204" pitchFamily="34" charset="0"/>
+              <a:buChar char="•"/>
+            </a:pPr>
+            <a:r>
+              <a:rPr lang="es-ES" dirty="0"/>
+              <a:t>Project status</a:t>
+            </a:r>
+          </a:p>
+        </p:txBody>
+      </p:sp>
+    </p:spTree>
+    <p:extLst>
+      <p:ext uri="{BB962C8B-B14F-4D97-AF65-F5344CB8AC3E}">
+        <p14:creationId xmlns:p14="http://schemas.microsoft.com/office/powerpoint/2010/main" val="1798364017"/>
+      </p:ext>
+    </p:extLst>
+  </p:cSld>
+  <p:clrMapOvr>
+    <a:masterClrMapping/>
+  </p:clrMapOvr>
+</p:sld>
+</file>
+
+<file path=ppt/slides/slide3.xml><?xml version="1.0" encoding="utf-8"?>
 <p:sld xmlns:a="http://schemas.openxmlformats.org/drawingml/2006/main" xmlns:r="http://schemas.openxmlformats.org/officeDocument/2006/relationships" xmlns:p="http://schemas.openxmlformats.org/presentationml/2006/main">
   <p:cSld>
     <p:spTree>
@@ -6622,7 +7004,7 @@
     </p:spTree>
     <p:extLst>
       <p:ext uri="{BB962C8B-B14F-4D97-AF65-F5344CB8AC3E}">
-        <p14:creationId xmlns:p14="http://schemas.microsoft.com/office/powerpoint/2010/main" val="1798364017"/>
+        <p14:creationId xmlns:p14="http://schemas.microsoft.com/office/powerpoint/2010/main" val="973483842"/>
       </p:ext>
     </p:extLst>
   </p:cSld>
@@ -6632,7 +7014,7 @@
 </p:sld>
 </file>
 
-<file path=ppt/slides/slide3.xml><?xml version="1.0" encoding="utf-8"?>
+<file path=ppt/slides/slide4.xml><?xml version="1.0" encoding="utf-8"?>
 <p:sld xmlns:a="http://schemas.openxmlformats.org/drawingml/2006/main" xmlns:r="http://schemas.openxmlformats.org/officeDocument/2006/relationships" xmlns:p="http://schemas.openxmlformats.org/presentationml/2006/main">
   <p:cSld>
     <p:spTree>
@@ -7166,7 +7548,7 @@
 </p:sld>
 </file>
 
-<file path=ppt/slides/slide4.xml><?xml version="1.0" encoding="utf-8"?>
+<file path=ppt/slides/slide5.xml><?xml version="1.0" encoding="utf-8"?>
 <p:sld xmlns:a="http://schemas.openxmlformats.org/drawingml/2006/main" xmlns:r="http://schemas.openxmlformats.org/officeDocument/2006/relationships" xmlns:p="http://schemas.openxmlformats.org/presentationml/2006/main">
   <p:cSld>
     <p:spTree>
@@ -7417,7 +7799,7 @@
 </p:sld>
 </file>
 
-<file path=ppt/slides/slide5.xml><?xml version="1.0" encoding="utf-8"?>
+<file path=ppt/slides/slide6.xml><?xml version="1.0" encoding="utf-8"?>
 <p:sld xmlns:a="http://schemas.openxmlformats.org/drawingml/2006/main" xmlns:r="http://schemas.openxmlformats.org/officeDocument/2006/relationships" xmlns:p="http://schemas.openxmlformats.org/presentationml/2006/main">
   <p:cSld>
     <p:spTree>
@@ -7671,371 +8053,6 @@
     <p:extLst>
       <p:ext uri="{BB962C8B-B14F-4D97-AF65-F5344CB8AC3E}">
         <p14:creationId xmlns:p14="http://schemas.microsoft.com/office/powerpoint/2010/main" val="1420267620"/>
-      </p:ext>
-    </p:extLst>
-  </p:cSld>
-  <p:clrMapOvr>
-    <a:masterClrMapping/>
-  </p:clrMapOvr>
-</p:sld>
-</file>
-
-<file path=ppt/slides/slide6.xml><?xml version="1.0" encoding="utf-8"?>
-<p:sld xmlns:a="http://schemas.openxmlformats.org/drawingml/2006/main" xmlns:r="http://schemas.openxmlformats.org/officeDocument/2006/relationships" xmlns:p="http://schemas.openxmlformats.org/presentationml/2006/main">
-  <p:cSld>
-    <p:spTree>
-      <p:nvGrpSpPr>
-        <p:cNvPr id="1" name=""/>
-        <p:cNvGrpSpPr/>
-        <p:nvPr/>
-      </p:nvGrpSpPr>
-      <p:grpSpPr>
-        <a:xfrm>
-          <a:off x="0" y="0"/>
-          <a:ext cx="0" cy="0"/>
-          <a:chOff x="0" y="0"/>
-          <a:chExt cx="0" cy="0"/>
-        </a:xfrm>
-      </p:grpSpPr>
-      <p:sp>
-        <p:nvSpPr>
-          <p:cNvPr id="2" name="Text Placeholder 1"/>
-          <p:cNvSpPr>
-            <a:spLocks noGrp="1"/>
-          </p:cNvSpPr>
-          <p:nvPr>
-            <p:ph type="body" sz="quarter" idx="20"/>
-          </p:nvPr>
-        </p:nvSpPr>
-        <p:spPr/>
-        <p:txBody>
-          <a:bodyPr/>
-          <a:lstStyle/>
-          <a:p>
-            <a:r>
-              <a:rPr lang="es-ES" dirty="0" err="1"/>
-              <a:t>Wing</a:t>
-            </a:r>
-            <a:r>
-              <a:rPr lang="es-ES" dirty="0"/>
-              <a:t> box </a:t>
-            </a:r>
-            <a:r>
-              <a:rPr lang="es-ES" dirty="0" err="1"/>
-              <a:t>model</a:t>
-            </a:r>
-            <a:r>
-              <a:rPr lang="es-ES" dirty="0"/>
-              <a:t> </a:t>
-            </a:r>
-            <a:r>
-              <a:rPr lang="es-ES" dirty="0" err="1"/>
-              <a:t>overview</a:t>
-            </a:r>
-            <a:endParaRPr lang="es-ES" dirty="0"/>
-          </a:p>
-        </p:txBody>
-      </p:sp>
-      <p:sp>
-        <p:nvSpPr>
-          <p:cNvPr id="7" name="TextBox 6"/>
-          <p:cNvSpPr txBox="1"/>
-          <p:nvPr/>
-        </p:nvSpPr>
-        <p:spPr>
-          <a:xfrm>
-            <a:off x="7233249" y="886253"/>
-            <a:ext cx="3476847" cy="369332"/>
-          </a:xfrm>
-          <a:prstGeom prst="rect">
-            <a:avLst/>
-          </a:prstGeom>
-          <a:noFill/>
-        </p:spPr>
-        <p:txBody>
-          <a:bodyPr wrap="square" rtlCol="0">
-            <a:spAutoFit/>
-          </a:bodyPr>
-          <a:lstStyle/>
-          <a:p>
-            <a:pPr algn="ctr"/>
-            <a:r>
-              <a:rPr lang="de-CH" dirty="0"/>
-              <a:t>Abaqus model with mesh</a:t>
-            </a:r>
-            <a:endParaRPr lang="en-US" dirty="0"/>
-          </a:p>
-        </p:txBody>
-      </p:sp>
-      <p:pic>
-        <p:nvPicPr>
-          <p:cNvPr id="8" name="Picture 7"/>
-          <p:cNvPicPr>
-            <a:picLocks noChangeAspect="1"/>
-          </p:cNvPicPr>
-          <p:nvPr/>
-        </p:nvPicPr>
-        <p:blipFill>
-          <a:blip r:embed="rId2" cstate="print">
-            <a:extLst>
-              <a:ext uri="{28A0092B-C50C-407E-A947-70E740481C1C}">
-                <a14:useLocalDpi xmlns:a14="http://schemas.microsoft.com/office/drawing/2010/main" val="0"/>
-              </a:ext>
-            </a:extLst>
-          </a:blip>
-          <a:stretch>
-            <a:fillRect/>
-          </a:stretch>
-        </p:blipFill>
-        <p:spPr>
-          <a:xfrm>
-            <a:off x="6187740" y="1354247"/>
-            <a:ext cx="5567867" cy="2686383"/>
-          </a:xfrm>
-          <a:prstGeom prst="rect">
-            <a:avLst/>
-          </a:prstGeom>
-        </p:spPr>
-      </p:pic>
-      <p:sp>
-        <p:nvSpPr>
-          <p:cNvPr id="9" name="TextBox 8"/>
-          <p:cNvSpPr txBox="1"/>
-          <p:nvPr/>
-        </p:nvSpPr>
-        <p:spPr>
-          <a:xfrm>
-            <a:off x="626266" y="1382825"/>
-            <a:ext cx="5571052" cy="4801314"/>
-          </a:xfrm>
-          <a:prstGeom prst="rect">
-            <a:avLst/>
-          </a:prstGeom>
-          <a:noFill/>
-        </p:spPr>
-        <p:txBody>
-          <a:bodyPr wrap="square" rtlCol="0">
-            <a:spAutoFit/>
-          </a:bodyPr>
-          <a:lstStyle/>
-          <a:p>
-            <a:pPr marL="285750" indent="-285750">
-              <a:buFont typeface="Arial" pitchFamily="34" charset="0"/>
-              <a:buChar char="•"/>
-            </a:pPr>
-            <a:r>
-              <a:rPr lang="es-ES" dirty="0"/>
-              <a:t>Script </a:t>
-            </a:r>
-            <a:r>
-              <a:rPr lang="es-ES" dirty="0" err="1"/>
-              <a:t>developed</a:t>
-            </a:r>
-            <a:r>
-              <a:rPr lang="es-ES" dirty="0"/>
-              <a:t> in </a:t>
-            </a:r>
-            <a:r>
-              <a:rPr lang="es-ES" dirty="0" err="1"/>
-              <a:t>Python</a:t>
-            </a:r>
-            <a:br>
-              <a:rPr lang="es-ES" dirty="0"/>
-            </a:br>
-            <a:endParaRPr lang="en-US" dirty="0"/>
-          </a:p>
-          <a:p>
-            <a:pPr marL="285750" indent="-285750">
-              <a:buFont typeface="Arial" pitchFamily="34" charset="0"/>
-              <a:buChar char="•"/>
-            </a:pPr>
-            <a:r>
-              <a:rPr lang="en-US" dirty="0"/>
-              <a:t>Fully parameterized</a:t>
-            </a:r>
-            <a:br>
-              <a:rPr lang="en-US" dirty="0"/>
-            </a:br>
-            <a:endParaRPr lang="en-US" dirty="0"/>
-          </a:p>
-          <a:p>
-            <a:pPr marL="285750" indent="-285750">
-              <a:buFont typeface="Arial" pitchFamily="34" charset="0"/>
-              <a:buChar char="•"/>
-            </a:pPr>
-            <a:r>
-              <a:rPr lang="en-US" dirty="0"/>
-              <a:t>Parameter study, with 5 variable parameters</a:t>
-            </a:r>
-          </a:p>
-          <a:p>
-            <a:pPr marL="742950" lvl="1" indent="-285750">
-              <a:buFont typeface="Arial" pitchFamily="34" charset="0"/>
-              <a:buChar char="•"/>
-            </a:pPr>
-            <a:r>
-              <a:rPr lang="es-ES" dirty="0"/>
-              <a:t>C-box </a:t>
-            </a:r>
-            <a:r>
-              <a:rPr lang="es-ES" dirty="0" err="1"/>
-              <a:t>thickness</a:t>
-            </a:r>
-            <a:endParaRPr lang="es-ES" dirty="0"/>
-          </a:p>
-          <a:p>
-            <a:pPr marL="742950" lvl="1" indent="-285750">
-              <a:buFont typeface="Arial" pitchFamily="34" charset="0"/>
-              <a:buChar char="•"/>
-            </a:pPr>
-            <a:r>
-              <a:rPr lang="es-ES" dirty="0" err="1"/>
-              <a:t>Rib</a:t>
-            </a:r>
-            <a:r>
-              <a:rPr lang="es-ES" dirty="0"/>
-              <a:t> </a:t>
-            </a:r>
-            <a:r>
-              <a:rPr lang="es-ES" dirty="0" err="1"/>
-              <a:t>thickness</a:t>
-            </a:r>
-            <a:endParaRPr lang="es-ES" dirty="0"/>
-          </a:p>
-          <a:p>
-            <a:pPr marL="742950" lvl="1" indent="-285750">
-              <a:buFont typeface="Arial" pitchFamily="34" charset="0"/>
-              <a:buChar char="•"/>
-            </a:pPr>
-            <a:r>
-              <a:rPr lang="es-ES" dirty="0" err="1"/>
-              <a:t>Rib</a:t>
-            </a:r>
-            <a:r>
-              <a:rPr lang="es-ES" dirty="0"/>
-              <a:t> </a:t>
-            </a:r>
-            <a:r>
-              <a:rPr lang="es-ES" dirty="0" err="1"/>
-              <a:t>frame</a:t>
-            </a:r>
-            <a:r>
-              <a:rPr lang="es-ES" dirty="0"/>
-              <a:t> </a:t>
-            </a:r>
-            <a:r>
-              <a:rPr lang="es-ES" dirty="0" err="1"/>
-              <a:t>width</a:t>
-            </a:r>
-            <a:endParaRPr lang="es-ES" dirty="0"/>
-          </a:p>
-          <a:p>
-            <a:pPr marL="742950" lvl="1" indent="-285750">
-              <a:buFont typeface="Arial" pitchFamily="34" charset="0"/>
-              <a:buChar char="•"/>
-            </a:pPr>
-            <a:r>
-              <a:rPr lang="es-ES" noProof="1"/>
-              <a:t>Chiral ligament eccentricity</a:t>
-            </a:r>
-          </a:p>
-          <a:p>
-            <a:pPr marL="742950" lvl="1" indent="-285750">
-              <a:buFont typeface="Arial" pitchFamily="34" charset="0"/>
-              <a:buChar char="•"/>
-            </a:pPr>
-            <a:r>
-              <a:rPr lang="es-ES" noProof="1"/>
-              <a:t>Chiral section thickness</a:t>
-            </a:r>
-            <a:br>
-              <a:rPr lang="es-ES" noProof="1"/>
-            </a:br>
-            <a:endParaRPr lang="es-ES" noProof="1"/>
-          </a:p>
-          <a:p>
-            <a:pPr marL="285750" indent="-285750">
-              <a:buFont typeface="Arial" pitchFamily="34" charset="0"/>
-              <a:buChar char="•"/>
-            </a:pPr>
-            <a:r>
-              <a:rPr lang="es-ES" noProof="1"/>
-              <a:t>Length in the spanwise dimension: 1m</a:t>
-            </a:r>
-          </a:p>
-          <a:p>
-            <a:pPr marL="742950" lvl="1" indent="-285750">
-              <a:buFont typeface="Arial" pitchFamily="34" charset="0"/>
-              <a:buChar char="•"/>
-            </a:pPr>
-            <a:endParaRPr lang="es-ES" noProof="1"/>
-          </a:p>
-          <a:p>
-            <a:pPr marL="285750" indent="-285750">
-              <a:buFont typeface="Arial" pitchFamily="34" charset="0"/>
-              <a:buChar char="•"/>
-            </a:pPr>
-            <a:r>
-              <a:rPr lang="es-ES" noProof="1"/>
-              <a:t>Fixed support at the wing root</a:t>
-            </a:r>
-          </a:p>
-          <a:p>
-            <a:pPr marL="285750" indent="-285750">
-              <a:buFont typeface="Arial" pitchFamily="34" charset="0"/>
-              <a:buChar char="•"/>
-            </a:pPr>
-            <a:endParaRPr lang="es-ES" noProof="1"/>
-          </a:p>
-          <a:p>
-            <a:pPr marL="285750" indent="-285750">
-              <a:buFont typeface="Arial" pitchFamily="34" charset="0"/>
-              <a:buChar char="•"/>
-            </a:pPr>
-            <a:r>
-              <a:rPr lang="es-ES" noProof="1"/>
-              <a:t>Various load introduction strategies</a:t>
-            </a:r>
-            <a:br>
-              <a:rPr lang="es-ES" noProof="1"/>
-            </a:br>
-            <a:endParaRPr lang="es-ES" noProof="1"/>
-          </a:p>
-        </p:txBody>
-      </p:sp>
-      <p:pic>
-        <p:nvPicPr>
-          <p:cNvPr id="10" name="Picture 9"/>
-          <p:cNvPicPr>
-            <a:picLocks noChangeAspect="1"/>
-          </p:cNvPicPr>
-          <p:nvPr/>
-        </p:nvPicPr>
-        <p:blipFill rotWithShape="1">
-          <a:blip r:embed="rId3">
-            <a:extLst>
-              <a:ext uri="{28A0092B-C50C-407E-A947-70E740481C1C}">
-                <a14:useLocalDpi xmlns:a14="http://schemas.microsoft.com/office/drawing/2010/main" val="0"/>
-              </a:ext>
-            </a:extLst>
-          </a:blip>
-          <a:srcRect l="18248" t="19954" r="11989" b="5599"/>
-          <a:stretch/>
-        </p:blipFill>
-        <p:spPr>
-          <a:xfrm>
-            <a:off x="6315535" y="3928141"/>
-            <a:ext cx="4636000" cy="2380585"/>
-          </a:xfrm>
-          <a:prstGeom prst="rect">
-            <a:avLst/>
-          </a:prstGeom>
-        </p:spPr>
-      </p:pic>
-    </p:spTree>
-    <p:extLst>
-      <p:ext uri="{BB962C8B-B14F-4D97-AF65-F5344CB8AC3E}">
-        <p14:creationId xmlns:p14="http://schemas.microsoft.com/office/powerpoint/2010/main" val="1514877584"/>
       </p:ext>
     </p:extLst>
   </p:cSld>
@@ -8087,7 +8104,7 @@
             </a:r>
             <a:r>
               <a:rPr lang="es-ES" dirty="0" err="1"/>
-              <a:t>nonlinear</a:t>
+              <a:t>model</a:t>
             </a:r>
             <a:r>
               <a:rPr lang="es-ES" dirty="0"/>
@@ -8095,15 +8112,7 @@
             </a:r>
             <a:r>
               <a:rPr lang="es-ES" dirty="0" err="1"/>
-              <a:t>simulations</a:t>
-            </a:r>
-            <a:r>
-              <a:rPr lang="es-ES" dirty="0"/>
-              <a:t> </a:t>
-            </a:r>
-            <a:r>
-              <a:rPr lang="es-ES" dirty="0" err="1"/>
-              <a:t>results</a:t>
+              <a:t>overview</a:t>
             </a:r>
             <a:endParaRPr lang="es-ES" dirty="0"/>
           </a:p>
@@ -8117,8 +8126,8 @@
         </p:nvSpPr>
         <p:spPr>
           <a:xfrm>
-            <a:off x="695400" y="1412776"/>
-            <a:ext cx="5400600" cy="369332"/>
+            <a:off x="7233249" y="886253"/>
+            <a:ext cx="3476847" cy="369332"/>
           </a:xfrm>
           <a:prstGeom prst="rect">
             <a:avLst/>
@@ -8131,9 +8140,10 @@
           </a:bodyPr>
           <a:lstStyle/>
           <a:p>
+            <a:pPr algn="ctr"/>
             <a:r>
               <a:rPr lang="de-CH" dirty="0"/>
-              <a:t>Single load introduction point on last rib</a:t>
+              <a:t>Abaqus model with mesh</a:t>
             </a:r>
             <a:endParaRPr lang="en-US" dirty="0"/>
           </a:p>
@@ -8141,14 +8151,14 @@
       </p:sp>
       <p:pic>
         <p:nvPicPr>
-          <p:cNvPr id="4" name="Picture 3"/>
+          <p:cNvPr id="8" name="Picture 7"/>
           <p:cNvPicPr>
             <a:picLocks noChangeAspect="1"/>
           </p:cNvPicPr>
           <p:nvPr/>
         </p:nvPicPr>
         <p:blipFill>
-          <a:blip r:embed="rId2">
+          <a:blip r:embed="rId2" cstate="print">
             <a:extLst>
               <a:ext uri="{28A0092B-C50C-407E-A947-70E740481C1C}">
                 <a14:useLocalDpi xmlns:a14="http://schemas.microsoft.com/office/drawing/2010/main" val="0"/>
@@ -8161,8 +8171,243 @@
         </p:blipFill>
         <p:spPr>
           <a:xfrm>
-            <a:off x="2351584" y="1921865"/>
-            <a:ext cx="7776864" cy="4421524"/>
+            <a:off x="6187740" y="1354247"/>
+            <a:ext cx="5567867" cy="2686383"/>
+          </a:xfrm>
+          <a:prstGeom prst="rect">
+            <a:avLst/>
+          </a:prstGeom>
+        </p:spPr>
+      </p:pic>
+      <p:sp>
+        <p:nvSpPr>
+          <p:cNvPr id="9" name="TextBox 8"/>
+          <p:cNvSpPr txBox="1"/>
+          <p:nvPr/>
+        </p:nvSpPr>
+        <p:spPr>
+          <a:xfrm>
+            <a:off x="626266" y="1382825"/>
+            <a:ext cx="5571052" cy="4801314"/>
+          </a:xfrm>
+          <a:prstGeom prst="rect">
+            <a:avLst/>
+          </a:prstGeom>
+          <a:noFill/>
+        </p:spPr>
+        <p:txBody>
+          <a:bodyPr wrap="square" rtlCol="0">
+            <a:spAutoFit/>
+          </a:bodyPr>
+          <a:lstStyle/>
+          <a:p>
+            <a:pPr marL="285750" indent="-285750">
+              <a:buFont typeface="Arial" pitchFamily="34" charset="0"/>
+              <a:buChar char="•"/>
+            </a:pPr>
+            <a:r>
+              <a:rPr lang="es-ES" dirty="0"/>
+              <a:t>Script </a:t>
+            </a:r>
+            <a:r>
+              <a:rPr lang="es-ES" dirty="0" err="1"/>
+              <a:t>developed</a:t>
+            </a:r>
+            <a:r>
+              <a:rPr lang="es-ES" dirty="0"/>
+              <a:t> in </a:t>
+            </a:r>
+            <a:r>
+              <a:rPr lang="es-ES" dirty="0" err="1"/>
+              <a:t>Python</a:t>
+            </a:r>
+            <a:br>
+              <a:rPr lang="es-ES" dirty="0"/>
+            </a:br>
+            <a:endParaRPr lang="en-US" dirty="0"/>
+          </a:p>
+          <a:p>
+            <a:pPr marL="285750" indent="-285750">
+              <a:buFont typeface="Arial" pitchFamily="34" charset="0"/>
+              <a:buChar char="•"/>
+            </a:pPr>
+            <a:r>
+              <a:rPr lang="en-US" dirty="0"/>
+              <a:t>Fully parameterized</a:t>
+            </a:r>
+            <a:br>
+              <a:rPr lang="en-US" dirty="0"/>
+            </a:br>
+            <a:endParaRPr lang="en-US" dirty="0"/>
+          </a:p>
+          <a:p>
+            <a:pPr marL="285750" indent="-285750">
+              <a:buFont typeface="Arial" pitchFamily="34" charset="0"/>
+              <a:buChar char="•"/>
+            </a:pPr>
+            <a:r>
+              <a:rPr lang="en-US" dirty="0"/>
+              <a:t>Parameter study, with 5 variable parameters</a:t>
+            </a:r>
+          </a:p>
+          <a:p>
+            <a:pPr marL="742950" lvl="1" indent="-285750">
+              <a:buFont typeface="Arial" pitchFamily="34" charset="0"/>
+              <a:buChar char="•"/>
+            </a:pPr>
+            <a:r>
+              <a:rPr lang="es-ES" dirty="0"/>
+              <a:t>C-box </a:t>
+            </a:r>
+            <a:r>
+              <a:rPr lang="es-ES" dirty="0" err="1"/>
+              <a:t>thickness</a:t>
+            </a:r>
+            <a:endParaRPr lang="es-ES" dirty="0"/>
+          </a:p>
+          <a:p>
+            <a:pPr marL="742950" lvl="1" indent="-285750">
+              <a:buFont typeface="Arial" pitchFamily="34" charset="0"/>
+              <a:buChar char="•"/>
+            </a:pPr>
+            <a:r>
+              <a:rPr lang="es-ES" dirty="0" err="1"/>
+              <a:t>Rib</a:t>
+            </a:r>
+            <a:r>
+              <a:rPr lang="es-ES" dirty="0"/>
+              <a:t> </a:t>
+            </a:r>
+            <a:r>
+              <a:rPr lang="es-ES" dirty="0" err="1"/>
+              <a:t>thickness</a:t>
+            </a:r>
+            <a:endParaRPr lang="es-ES" dirty="0"/>
+          </a:p>
+          <a:p>
+            <a:pPr marL="742950" lvl="1" indent="-285750">
+              <a:buFont typeface="Arial" pitchFamily="34" charset="0"/>
+              <a:buChar char="•"/>
+            </a:pPr>
+            <a:r>
+              <a:rPr lang="es-ES" dirty="0" err="1"/>
+              <a:t>Rib</a:t>
+            </a:r>
+            <a:r>
+              <a:rPr lang="es-ES" dirty="0"/>
+              <a:t> </a:t>
+            </a:r>
+            <a:r>
+              <a:rPr lang="es-ES" dirty="0" err="1"/>
+              <a:t>frame</a:t>
+            </a:r>
+            <a:r>
+              <a:rPr lang="es-ES" dirty="0"/>
+              <a:t> </a:t>
+            </a:r>
+            <a:r>
+              <a:rPr lang="es-ES" dirty="0" err="1"/>
+              <a:t>width</a:t>
+            </a:r>
+            <a:endParaRPr lang="es-ES" dirty="0"/>
+          </a:p>
+          <a:p>
+            <a:pPr marL="742950" lvl="1" indent="-285750">
+              <a:buFont typeface="Arial" pitchFamily="34" charset="0"/>
+              <a:buChar char="•"/>
+            </a:pPr>
+            <a:r>
+              <a:rPr lang="es-ES" noProof="1"/>
+              <a:t>Chiral ligament eccentricity</a:t>
+            </a:r>
+          </a:p>
+          <a:p>
+            <a:pPr marL="742950" lvl="1" indent="-285750">
+              <a:buFont typeface="Arial" pitchFamily="34" charset="0"/>
+              <a:buChar char="•"/>
+            </a:pPr>
+            <a:r>
+              <a:rPr lang="es-ES" noProof="1"/>
+              <a:t>Chiral section thickness</a:t>
+            </a:r>
+            <a:br>
+              <a:rPr lang="es-ES" noProof="1"/>
+            </a:br>
+            <a:endParaRPr lang="es-ES" noProof="1"/>
+          </a:p>
+          <a:p>
+            <a:pPr marL="285750" indent="-285750">
+              <a:buFont typeface="Arial" pitchFamily="34" charset="0"/>
+              <a:buChar char="•"/>
+            </a:pPr>
+            <a:r>
+              <a:rPr lang="es-ES" noProof="1"/>
+              <a:t>Length in the spanwise dimension: 1m</a:t>
+            </a:r>
+          </a:p>
+          <a:p>
+            <a:pPr marL="742950" lvl="1" indent="-285750">
+              <a:buFont typeface="Arial" pitchFamily="34" charset="0"/>
+              <a:buChar char="•"/>
+            </a:pPr>
+            <a:endParaRPr lang="es-ES" noProof="1"/>
+          </a:p>
+          <a:p>
+            <a:pPr marL="285750" indent="-285750">
+              <a:buFont typeface="Arial" pitchFamily="34" charset="0"/>
+              <a:buChar char="•"/>
+            </a:pPr>
+            <a:r>
+              <a:rPr lang="es-ES" noProof="1"/>
+              <a:t>Fixed support at the wing root</a:t>
+            </a:r>
+          </a:p>
+          <a:p>
+            <a:pPr marL="285750" indent="-285750">
+              <a:buFont typeface="Arial" pitchFamily="34" charset="0"/>
+              <a:buChar char="•"/>
+            </a:pPr>
+            <a:endParaRPr lang="es-ES" noProof="1"/>
+          </a:p>
+          <a:p>
+            <a:pPr marL="285750" indent="-285750">
+              <a:buFont typeface="Arial" pitchFamily="34" charset="0"/>
+              <a:buChar char="•"/>
+            </a:pPr>
+            <a:r>
+              <a:rPr lang="es-ES" noProof="1"/>
+              <a:t>Various load introduction strategies</a:t>
+            </a:r>
+            <a:br>
+              <a:rPr lang="es-ES" noProof="1"/>
+            </a:br>
+            <a:endParaRPr lang="es-ES" noProof="1"/>
+          </a:p>
+        </p:txBody>
+      </p:sp>
+      <p:pic>
+        <p:nvPicPr>
+          <p:cNvPr id="10" name="Picture 9"/>
+          <p:cNvPicPr>
+            <a:picLocks noChangeAspect="1"/>
+          </p:cNvPicPr>
+          <p:nvPr/>
+        </p:nvPicPr>
+        <p:blipFill rotWithShape="1">
+          <a:blip r:embed="rId3">
+            <a:extLst>
+              <a:ext uri="{28A0092B-C50C-407E-A947-70E740481C1C}">
+                <a14:useLocalDpi xmlns:a14="http://schemas.microsoft.com/office/drawing/2010/main" val="0"/>
+              </a:ext>
+            </a:extLst>
+          </a:blip>
+          <a:srcRect l="18248" t="19954" r="11989" b="5599"/>
+          <a:stretch/>
+        </p:blipFill>
+        <p:spPr>
+          <a:xfrm>
+            <a:off x="6315535" y="3928141"/>
+            <a:ext cx="4636000" cy="2380585"/>
           </a:xfrm>
           <a:prstGeom prst="rect">
             <a:avLst/>
@@ -8172,7 +8417,7 @@
     </p:spTree>
     <p:extLst>
       <p:ext uri="{BB962C8B-B14F-4D97-AF65-F5344CB8AC3E}">
-        <p14:creationId xmlns:p14="http://schemas.microsoft.com/office/powerpoint/2010/main" val="3813847900"/>
+        <p14:creationId xmlns:p14="http://schemas.microsoft.com/office/powerpoint/2010/main" val="1514877584"/>
       </p:ext>
     </p:extLst>
   </p:cSld>
@@ -8270,7 +8515,7 @@
           <a:p>
             <a:r>
               <a:rPr lang="de-CH" dirty="0"/>
-              <a:t>Multiple load introduction points on inner ribs</a:t>
+              <a:t>Single load introduction point on last rib</a:t>
             </a:r>
             <a:endParaRPr lang="en-US" dirty="0"/>
           </a:p>
@@ -8299,7 +8544,7 @@
         <p:spPr>
           <a:xfrm>
             <a:off x="2351584" y="1921865"/>
-            <a:ext cx="7776864" cy="4421523"/>
+            <a:ext cx="7776864" cy="4421524"/>
           </a:xfrm>
           <a:prstGeom prst="rect">
             <a:avLst/>
@@ -8309,7 +8554,7 @@
     </p:spTree>
     <p:extLst>
       <p:ext uri="{BB962C8B-B14F-4D97-AF65-F5344CB8AC3E}">
-        <p14:creationId xmlns:p14="http://schemas.microsoft.com/office/powerpoint/2010/main" val="3539386742"/>
+        <p14:creationId xmlns:p14="http://schemas.microsoft.com/office/powerpoint/2010/main" val="3813847900"/>
       </p:ext>
     </p:extLst>
   </p:cSld>
@@ -8392,7 +8637,7 @@
         <p:spPr>
           <a:xfrm>
             <a:off x="695400" y="1412776"/>
-            <a:ext cx="6192688" cy="369332"/>
+            <a:ext cx="5400600" cy="369332"/>
           </a:xfrm>
           <a:prstGeom prst="rect">
             <a:avLst/>
@@ -8407,7 +8652,7 @@
           <a:p>
             <a:r>
               <a:rPr lang="de-CH" dirty="0"/>
-              <a:t>Beam twist evolution with the fraction of load applied</a:t>
+              <a:t>Multiple load introduction points on inner ribs</a:t>
             </a:r>
             <a:endParaRPr lang="en-US" dirty="0"/>
           </a:p>
@@ -8435,8 +8680,8 @@
         </p:blipFill>
         <p:spPr>
           <a:xfrm>
-            <a:off x="2351584" y="1761561"/>
-            <a:ext cx="7513971" cy="4581828"/>
+            <a:off x="2351584" y="1921865"/>
+            <a:ext cx="7776864" cy="4421523"/>
           </a:xfrm>
           <a:prstGeom prst="rect">
             <a:avLst/>
@@ -8446,7 +8691,7 @@
     </p:spTree>
     <p:extLst>
       <p:ext uri="{BB962C8B-B14F-4D97-AF65-F5344CB8AC3E}">
-        <p14:creationId xmlns:p14="http://schemas.microsoft.com/office/powerpoint/2010/main" val="3265074744"/>
+        <p14:creationId xmlns:p14="http://schemas.microsoft.com/office/powerpoint/2010/main" val="3539386742"/>
       </p:ext>
     </p:extLst>
   </p:cSld>
@@ -9525,21 +9770,6 @@
 </file>
 
 <file path=customXml/item1.xml><?xml version="1.0" encoding="utf-8"?>
-<?mso-contentType ?>
-<FormTemplates xmlns="http://schemas.microsoft.com/sharepoint/v3/contenttype/forms">
-  <Display>DocumentLibraryForm</Display>
-  <Edit>DocumentLibraryForm</Edit>
-  <New>DocumentLibraryForm</New>
-</FormTemplates>
-</file>
-
-<file path=customXml/item2.xml><?xml version="1.0" encoding="utf-8"?>
-<p:properties xmlns:p="http://schemas.microsoft.com/office/2006/metadata/properties" xmlns:xsi="http://www.w3.org/2001/XMLSchema-instance" xmlns:pc="http://schemas.microsoft.com/office/infopath/2007/PartnerControls">
-  <documentManagement/>
-</p:properties>
-</file>
-
-<file path=customXml/item3.xml><?xml version="1.0" encoding="utf-8"?>
 <ct:contentTypeSchema xmlns:ct="http://schemas.microsoft.com/office/2006/metadata/contentType" xmlns:ma="http://schemas.microsoft.com/office/2006/metadata/properties/metaAttributes" ct:_="" ma:_="" ma:contentTypeName="Document" ma:contentTypeID="0x01010029F9A780F40D6D43967DF6A0E4BBBC14" ma:contentTypeVersion="3" ma:contentTypeDescription="Create a new document." ma:contentTypeScope="" ma:versionID="46084dd6e4eb7f4e55e22b01662baf7b">
   <xsd:schema xmlns:xsd="http://www.w3.org/2001/XMLSchema" xmlns:xs="http://www.w3.org/2001/XMLSchema" xmlns:p="http://schemas.microsoft.com/office/2006/metadata/properties" targetNamespace="http://schemas.microsoft.com/office/2006/metadata/properties" ma:root="true" ma:fieldsID="8022916f55ab85163ee9a5069dec31d5">
     <xsd:element name="properties">
@@ -9653,10 +9883,33 @@
 </ct:contentTypeSchema>
 </file>
 
+<file path=customXml/item2.xml><?xml version="1.0" encoding="utf-8"?>
+<p:properties xmlns:p="http://schemas.microsoft.com/office/2006/metadata/properties" xmlns:xsi="http://www.w3.org/2001/XMLSchema-instance" xmlns:pc="http://schemas.microsoft.com/office/infopath/2007/PartnerControls">
+  <documentManagement/>
+</p:properties>
+</file>
+
+<file path=customXml/item3.xml><?xml version="1.0" encoding="utf-8"?>
+<?mso-contentType ?>
+<FormTemplates xmlns="http://schemas.microsoft.com/sharepoint/v3/contenttype/forms">
+  <Display>DocumentLibraryForm</Display>
+  <Edit>DocumentLibraryForm</Edit>
+  <New>DocumentLibraryForm</New>
+</FormTemplates>
+</file>
+
 <file path=customXml/itemProps1.xml><?xml version="1.0" encoding="utf-8"?>
-<ds:datastoreItem xmlns:ds="http://schemas.openxmlformats.org/officeDocument/2006/customXml" ds:itemID="{8F2FDF69-5A1A-4E32-A5EE-49837B61342A}">
+<ds:datastoreItem xmlns:ds="http://schemas.openxmlformats.org/officeDocument/2006/customXml" ds:itemID="{7DD48CA2-582A-4403-B04A-9D1525385275}">
   <ds:schemaRefs>
-    <ds:schemaRef ds:uri="http://schemas.microsoft.com/sharepoint/v3/contenttype/forms"/>
+    <ds:schemaRef ds:uri="http://schemas.microsoft.com/office/2006/metadata/contentType"/>
+    <ds:schemaRef ds:uri="http://schemas.microsoft.com/office/2006/metadata/properties/metaAttributes"/>
+    <ds:schemaRef ds:uri="http://www.w3.org/2001/XMLSchema"/>
+    <ds:schemaRef ds:uri="http://schemas.microsoft.com/office/2006/metadata/properties"/>
+    <ds:schemaRef ds:uri="http://schemas.openxmlformats.org/package/2006/metadata/core-properties"/>
+    <ds:schemaRef ds:uri="http://purl.org/dc/elements/1.1/"/>
+    <ds:schemaRef ds:uri="http://purl.org/dc/terms/"/>
+    <ds:schemaRef ds:uri="http://schemas.microsoft.com/internal/obd"/>
+    <ds:schemaRef ds:uri="http://schemas.microsoft.com/office/infopath/2007/PartnerControls"/>
   </ds:schemaRefs>
 </ds:datastoreItem>
 </file>
@@ -9677,17 +9930,9 @@
 </file>
 
 <file path=customXml/itemProps3.xml><?xml version="1.0" encoding="utf-8"?>
-<ds:datastoreItem xmlns:ds="http://schemas.openxmlformats.org/officeDocument/2006/customXml" ds:itemID="{7DD48CA2-582A-4403-B04A-9D1525385275}">
+<ds:datastoreItem xmlns:ds="http://schemas.openxmlformats.org/officeDocument/2006/customXml" ds:itemID="{8F2FDF69-5A1A-4E32-A5EE-49837B61342A}">
   <ds:schemaRefs>
-    <ds:schemaRef ds:uri="http://schemas.microsoft.com/office/2006/metadata/contentType"/>
-    <ds:schemaRef ds:uri="http://schemas.microsoft.com/office/2006/metadata/properties/metaAttributes"/>
-    <ds:schemaRef ds:uri="http://www.w3.org/2001/XMLSchema"/>
-    <ds:schemaRef ds:uri="http://schemas.microsoft.com/office/2006/metadata/properties"/>
-    <ds:schemaRef ds:uri="http://schemas.openxmlformats.org/package/2006/metadata/core-properties"/>
-    <ds:schemaRef ds:uri="http://purl.org/dc/elements/1.1/"/>
-    <ds:schemaRef ds:uri="http://purl.org/dc/terms/"/>
-    <ds:schemaRef ds:uri="http://schemas.microsoft.com/internal/obd"/>
-    <ds:schemaRef ds:uri="http://schemas.microsoft.com/office/infopath/2007/PartnerControls"/>
+    <ds:schemaRef ds:uri="http://schemas.microsoft.com/sharepoint/v3/contenttype/forms"/>
   </ds:schemaRefs>
 </ds:datastoreItem>
 </file>
</xml_diff>